<commit_message>
moving sublime project files to upper level
</commit_message>
<xml_diff>
--- a/Work-place/GANs.pptx
+++ b/Work-place/GANs.pptx
@@ -5,16 +5,17 @@
     <p:sldMasterId id="2147483648" r:id="rId1"/>
   </p:sldMasterIdLst>
   <p:notesMasterIdLst>
-    <p:notesMasterId r:id="rId9"/>
+    <p:notesMasterId r:id="rId10"/>
   </p:notesMasterIdLst>
   <p:sldIdLst>
     <p:sldId id="256" r:id="rId2"/>
     <p:sldId id="257" r:id="rId3"/>
-    <p:sldId id="258" r:id="rId4"/>
-    <p:sldId id="260" r:id="rId5"/>
-    <p:sldId id="261" r:id="rId6"/>
-    <p:sldId id="263" r:id="rId7"/>
-    <p:sldId id="264" r:id="rId8"/>
+    <p:sldId id="265" r:id="rId4"/>
+    <p:sldId id="258" r:id="rId5"/>
+    <p:sldId id="260" r:id="rId6"/>
+    <p:sldId id="261" r:id="rId7"/>
+    <p:sldId id="263" r:id="rId8"/>
+    <p:sldId id="264" r:id="rId9"/>
   </p:sldIdLst>
   <p:sldSz cx="12192000" cy="6858000"/>
   <p:notesSz cx="6858000" cy="9144000"/>
@@ -113,6 +114,11 @@
       </a:defRPr>
     </a:lvl9pPr>
   </p:defaultTextStyle>
+  <p:extLst>
+    <p:ext uri="{EFAFB233-063F-42B5-8137-9DF3F51BA10A}">
+      <p15:sldGuideLst xmlns:p15="http://schemas.microsoft.com/office/powerpoint/2012/main"/>
+    </p:ext>
+  </p:extLst>
 </p:presentation>
 </file>
 
@@ -198,7 +204,7 @@
           <a:p>
             <a:fld id="{D81DA651-5222-404F-9461-D265DB16C209}" type="datetimeFigureOut">
               <a:rPr lang="en-US" smtClean="0"/>
-              <a:t>7/30/17</a:t>
+              <a:t>7/31/2017</a:t>
             </a:fld>
             <a:endParaRPr lang="en-US"/>
           </a:p>
@@ -531,7 +537,7 @@
           <a:p>
             <a:fld id="{646F29F4-679D-EC4E-B00D-A48E2DCA45BD}" type="slidenum">
               <a:rPr lang="en-US" smtClean="0"/>
-              <a:t>7</a:t>
+              <a:t>8</a:t>
             </a:fld>
             <a:endParaRPr lang="en-US"/>
           </a:p>
@@ -681,7 +687,7 @@
           <a:p>
             <a:fld id="{C33528DF-919A-144C-B089-73C66F018D90}" type="datetimeFigureOut">
               <a:rPr lang="en-US" smtClean="0"/>
-              <a:t>7/30/17</a:t>
+              <a:t>7/31/2017</a:t>
             </a:fld>
             <a:endParaRPr lang="en-US"/>
           </a:p>
@@ -851,7 +857,7 @@
           <a:p>
             <a:fld id="{C33528DF-919A-144C-B089-73C66F018D90}" type="datetimeFigureOut">
               <a:rPr lang="en-US" smtClean="0"/>
-              <a:t>7/30/17</a:t>
+              <a:t>7/31/2017</a:t>
             </a:fld>
             <a:endParaRPr lang="en-US"/>
           </a:p>
@@ -1031,7 +1037,7 @@
           <a:p>
             <a:fld id="{C33528DF-919A-144C-B089-73C66F018D90}" type="datetimeFigureOut">
               <a:rPr lang="en-US" smtClean="0"/>
-              <a:t>7/30/17</a:t>
+              <a:t>7/31/2017</a:t>
             </a:fld>
             <a:endParaRPr lang="en-US"/>
           </a:p>
@@ -1201,7 +1207,7 @@
           <a:p>
             <a:fld id="{C33528DF-919A-144C-B089-73C66F018D90}" type="datetimeFigureOut">
               <a:rPr lang="en-US" smtClean="0"/>
-              <a:t>7/30/17</a:t>
+              <a:t>7/31/2017</a:t>
             </a:fld>
             <a:endParaRPr lang="en-US"/>
           </a:p>
@@ -1447,7 +1453,7 @@
           <a:p>
             <a:fld id="{C33528DF-919A-144C-B089-73C66F018D90}" type="datetimeFigureOut">
               <a:rPr lang="en-US" smtClean="0"/>
-              <a:t>7/30/17</a:t>
+              <a:t>7/31/2017</a:t>
             </a:fld>
             <a:endParaRPr lang="en-US"/>
           </a:p>
@@ -1679,7 +1685,7 @@
           <a:p>
             <a:fld id="{C33528DF-919A-144C-B089-73C66F018D90}" type="datetimeFigureOut">
               <a:rPr lang="en-US" smtClean="0"/>
-              <a:t>7/30/17</a:t>
+              <a:t>7/31/2017</a:t>
             </a:fld>
             <a:endParaRPr lang="en-US"/>
           </a:p>
@@ -2046,7 +2052,7 @@
           <a:p>
             <a:fld id="{C33528DF-919A-144C-B089-73C66F018D90}" type="datetimeFigureOut">
               <a:rPr lang="en-US" smtClean="0"/>
-              <a:t>7/30/17</a:t>
+              <a:t>7/31/2017</a:t>
             </a:fld>
             <a:endParaRPr lang="en-US"/>
           </a:p>
@@ -2164,7 +2170,7 @@
           <a:p>
             <a:fld id="{C33528DF-919A-144C-B089-73C66F018D90}" type="datetimeFigureOut">
               <a:rPr lang="en-US" smtClean="0"/>
-              <a:t>7/30/17</a:t>
+              <a:t>7/31/2017</a:t>
             </a:fld>
             <a:endParaRPr lang="en-US"/>
           </a:p>
@@ -2259,7 +2265,7 @@
           <a:p>
             <a:fld id="{C33528DF-919A-144C-B089-73C66F018D90}" type="datetimeFigureOut">
               <a:rPr lang="en-US" smtClean="0"/>
-              <a:t>7/30/17</a:t>
+              <a:t>7/31/2017</a:t>
             </a:fld>
             <a:endParaRPr lang="en-US"/>
           </a:p>
@@ -2536,7 +2542,7 @@
           <a:p>
             <a:fld id="{C33528DF-919A-144C-B089-73C66F018D90}" type="datetimeFigureOut">
               <a:rPr lang="en-US" smtClean="0"/>
-              <a:t>7/30/17</a:t>
+              <a:t>7/31/2017</a:t>
             </a:fld>
             <a:endParaRPr lang="en-US"/>
           </a:p>
@@ -2789,7 +2795,7 @@
           <a:p>
             <a:fld id="{C33528DF-919A-144C-B089-73C66F018D90}" type="datetimeFigureOut">
               <a:rPr lang="en-US" smtClean="0"/>
-              <a:t>7/30/17</a:t>
+              <a:t>7/31/2017</a:t>
             </a:fld>
             <a:endParaRPr lang="en-US"/>
           </a:p>
@@ -3002,7 +3008,7 @@
           <a:p>
             <a:fld id="{C33528DF-919A-144C-B089-73C66F018D90}" type="datetimeFigureOut">
               <a:rPr lang="en-US" smtClean="0"/>
-              <a:t>7/30/17</a:t>
+              <a:t>7/31/2017</a:t>
             </a:fld>
             <a:endParaRPr lang="en-US"/>
           </a:p>
@@ -3557,21 +3563,21 @@
       </p:grpSpPr>
       <p:sp>
         <p:nvSpPr>
-          <p:cNvPr id="25" name="Right Arrow 24"/>
+          <p:cNvPr id="5" name="정육면체 4"/>
           <p:cNvSpPr/>
           <p:nvPr/>
         </p:nvSpPr>
         <p:spPr>
           <a:xfrm>
-            <a:off x="1680628" y="2878667"/>
-            <a:ext cx="10104972" cy="1159932"/>
-          </a:xfrm>
-          <a:prstGeom prst="rightArrow">
+            <a:off x="4978397" y="387927"/>
+            <a:ext cx="1893455" cy="517236"/>
+          </a:xfrm>
+          <a:prstGeom prst="cube">
             <a:avLst/>
           </a:prstGeom>
           <a:solidFill>
-            <a:schemeClr val="accent1">
-              <a:alpha val="43000"/>
+            <a:schemeClr val="bg1">
+              <a:lumMod val="65000"/>
             </a:schemeClr>
           </a:solidFill>
           <a:ln>
@@ -3599,43 +3605,30 @@
           <a:lstStyle/>
           <a:p>
             <a:pPr algn="ctr"/>
-            <a:endParaRPr lang="en-US"/>
-          </a:p>
-        </p:txBody>
-      </p:sp>
-      <p:sp>
-        <p:nvSpPr>
-          <p:cNvPr id="4" name="Rectangle 3"/>
+            <a:endParaRPr lang="ko-KR" altLang="en-US"/>
+          </a:p>
+        </p:txBody>
+      </p:sp>
+      <p:sp>
+        <p:nvSpPr>
+          <p:cNvPr id="6" name="정육면체 5"/>
           <p:cNvSpPr/>
           <p:nvPr/>
         </p:nvSpPr>
         <p:spPr>
           <a:xfrm>
-            <a:off x="1680628" y="2353732"/>
-            <a:ext cx="444500" cy="1947335"/>
-          </a:xfrm>
-          <a:prstGeom prst="rect">
+            <a:off x="4380340" y="1143129"/>
+            <a:ext cx="3089562" cy="517236"/>
+          </a:xfrm>
+          <a:prstGeom prst="cube">
             <a:avLst/>
           </a:prstGeom>
           <a:solidFill>
-            <a:schemeClr val="bg1">
-              <a:lumMod val="50000"/>
-            </a:schemeClr>
+            <a:schemeClr val="accent2"/>
           </a:solidFill>
           <a:ln>
             <a:noFill/>
           </a:ln>
-          <a:scene3d>
-            <a:camera prst="isometricOffAxis1Left"/>
-            <a:lightRig rig="balanced" dir="t"/>
-          </a:scene3d>
-          <a:sp3d extrusionH="381000">
-            <a:extrusionClr>
-              <a:schemeClr val="bg1">
-                <a:lumMod val="50000"/>
-              </a:schemeClr>
-            </a:extrusionClr>
-          </a:sp3d>
         </p:spPr>
         <p:style>
           <a:lnRef idx="2">
@@ -3658,39 +3651,30 @@
           <a:lstStyle/>
           <a:p>
             <a:pPr algn="ctr"/>
-            <a:endParaRPr lang="en-US"/>
-          </a:p>
-        </p:txBody>
-      </p:sp>
-      <p:sp>
-        <p:nvSpPr>
-          <p:cNvPr id="6" name="Rectangle 5"/>
+            <a:endParaRPr lang="ko-KR" altLang="en-US"/>
+          </a:p>
+        </p:txBody>
+      </p:sp>
+      <p:sp>
+        <p:nvSpPr>
+          <p:cNvPr id="8" name="정육면체 7"/>
           <p:cNvSpPr/>
           <p:nvPr/>
         </p:nvSpPr>
         <p:spPr>
           <a:xfrm>
-            <a:off x="3509428" y="1727200"/>
-            <a:ext cx="444500" cy="3098800"/>
-          </a:xfrm>
-          <a:prstGeom prst="rect">
+            <a:off x="7426036" y="1143129"/>
+            <a:ext cx="369455" cy="517236"/>
+          </a:xfrm>
+          <a:prstGeom prst="cube">
             <a:avLst/>
           </a:prstGeom>
           <a:solidFill>
-            <a:schemeClr val="accent2"/>
+            <a:schemeClr val="accent4"/>
           </a:solidFill>
           <a:ln>
             <a:noFill/>
           </a:ln>
-          <a:scene3d>
-            <a:camera prst="isometricOffAxis1Left"/>
-            <a:lightRig rig="balanced" dir="t"/>
-          </a:scene3d>
-          <a:sp3d extrusionH="381000">
-            <a:extrusionClr>
-              <a:schemeClr val="accent2"/>
-            </a:extrusionClr>
-          </a:sp3d>
         </p:spPr>
         <p:style>
           <a:lnRef idx="2">
@@ -3713,104 +3697,30 @@
           <a:lstStyle/>
           <a:p>
             <a:pPr algn="ctr"/>
-            <a:endParaRPr lang="en-US"/>
-          </a:p>
-        </p:txBody>
-      </p:sp>
-      <p:sp>
-        <p:nvSpPr>
-          <p:cNvPr id="7" name="TextBox 6"/>
-          <p:cNvSpPr txBox="1"/>
-          <p:nvPr/>
-        </p:nvSpPr>
-        <p:spPr>
-          <a:xfrm>
-            <a:off x="1680628" y="5740397"/>
-            <a:ext cx="742511" cy="369332"/>
-          </a:xfrm>
-          <a:prstGeom prst="rect">
-            <a:avLst/>
-          </a:prstGeom>
-          <a:noFill/>
-        </p:spPr>
-        <p:txBody>
-          <a:bodyPr wrap="none" rtlCol="0">
-            <a:spAutoFit/>
-          </a:bodyPr>
-          <a:lstStyle/>
-          <a:p>
-            <a:pPr algn="ctr"/>
-            <a:r>
-              <a:rPr lang="en-US" dirty="0"/>
-              <a:t>z</a:t>
-            </a:r>
-            <a:r>
-              <a:rPr lang="en-US" dirty="0" smtClean="0"/>
-              <a:t>: 100</a:t>
-            </a:r>
-            <a:endParaRPr lang="en-US" dirty="0"/>
-          </a:p>
-        </p:txBody>
-      </p:sp>
-      <p:sp>
-        <p:nvSpPr>
-          <p:cNvPr id="8" name="TextBox 7"/>
-          <p:cNvSpPr txBox="1"/>
-          <p:nvPr/>
-        </p:nvSpPr>
-        <p:spPr>
-          <a:xfrm>
-            <a:off x="3514673" y="5740397"/>
-            <a:ext cx="878509" cy="369332"/>
-          </a:xfrm>
-          <a:prstGeom prst="rect">
-            <a:avLst/>
-          </a:prstGeom>
-          <a:noFill/>
-        </p:spPr>
-        <p:txBody>
-          <a:bodyPr wrap="none" rtlCol="0">
-            <a:spAutoFit/>
-          </a:bodyPr>
-          <a:lstStyle/>
-          <a:p>
-            <a:pPr algn="ctr"/>
-            <a:r>
-              <a:rPr lang="en-US" dirty="0" smtClean="0"/>
-              <a:t>FC: 128</a:t>
-            </a:r>
-          </a:p>
-        </p:txBody>
-      </p:sp>
-      <p:sp>
-        <p:nvSpPr>
-          <p:cNvPr id="9" name="Rectangle 8"/>
+            <a:endParaRPr lang="ko-KR" altLang="en-US"/>
+          </a:p>
+        </p:txBody>
+      </p:sp>
+      <p:sp>
+        <p:nvSpPr>
+          <p:cNvPr id="9" name="정육면체 8"/>
           <p:cNvSpPr/>
           <p:nvPr/>
         </p:nvSpPr>
         <p:spPr>
           <a:xfrm>
-            <a:off x="4577272" y="1727200"/>
-            <a:ext cx="444500" cy="3098800"/>
-          </a:xfrm>
-          <a:prstGeom prst="rect">
+            <a:off x="5401605" y="1898331"/>
+            <a:ext cx="1022925" cy="517236"/>
+          </a:xfrm>
+          <a:prstGeom prst="cube">
             <a:avLst/>
           </a:prstGeom>
           <a:solidFill>
-            <a:schemeClr val="accent4"/>
+            <a:schemeClr val="accent2"/>
           </a:solidFill>
           <a:ln>
             <a:noFill/>
           </a:ln>
-          <a:scene3d>
-            <a:camera prst="isometricOffAxis1Left"/>
-            <a:lightRig rig="balanced" dir="t"/>
-          </a:scene3d>
-          <a:sp3d extrusionH="381000">
-            <a:extrusionClr>
-              <a:schemeClr val="accent4"/>
-            </a:extrusionClr>
-          </a:sp3d>
         </p:spPr>
         <p:style>
           <a:lnRef idx="2">
@@ -3833,77 +3743,30 @@
           <a:lstStyle/>
           <a:p>
             <a:pPr algn="ctr"/>
-            <a:endParaRPr lang="en-US"/>
-          </a:p>
-        </p:txBody>
-      </p:sp>
-      <p:sp>
-        <p:nvSpPr>
-          <p:cNvPr id="10" name="TextBox 9"/>
-          <p:cNvSpPr txBox="1"/>
-          <p:nvPr/>
-        </p:nvSpPr>
-        <p:spPr>
-          <a:xfrm>
-            <a:off x="4663341" y="5740397"/>
-            <a:ext cx="716863" cy="646331"/>
-          </a:xfrm>
-          <a:prstGeom prst="rect">
-            <a:avLst/>
-          </a:prstGeom>
-          <a:noFill/>
-        </p:spPr>
-        <p:txBody>
-          <a:bodyPr wrap="none" rtlCol="0">
-            <a:spAutoFit/>
-          </a:bodyPr>
-          <a:lstStyle/>
-          <a:p>
-            <a:pPr algn="ctr"/>
-            <a:r>
-              <a:rPr lang="en-US" dirty="0" smtClean="0"/>
-              <a:t>Leaky</a:t>
-            </a:r>
-          </a:p>
-          <a:p>
-            <a:pPr algn="ctr"/>
-            <a:r>
-              <a:rPr lang="en-US" dirty="0" err="1" smtClean="0"/>
-              <a:t>ReLU</a:t>
-            </a:r>
-            <a:endParaRPr lang="en-US" dirty="0" smtClean="0"/>
-          </a:p>
-        </p:txBody>
-      </p:sp>
-      <p:sp>
-        <p:nvSpPr>
-          <p:cNvPr id="11" name="Rectangle 10"/>
+            <a:endParaRPr lang="ko-KR" altLang="en-US"/>
+          </a:p>
+        </p:txBody>
+      </p:sp>
+      <p:sp>
+        <p:nvSpPr>
+          <p:cNvPr id="10" name="정육면체 9"/>
           <p:cNvSpPr/>
           <p:nvPr/>
         </p:nvSpPr>
         <p:spPr>
           <a:xfrm>
-            <a:off x="6325865" y="2760132"/>
-            <a:ext cx="444500" cy="1278467"/>
-          </a:xfrm>
-          <a:prstGeom prst="rect">
+            <a:off x="6374883" y="1898331"/>
+            <a:ext cx="369455" cy="517236"/>
+          </a:xfrm>
+          <a:prstGeom prst="cube">
             <a:avLst/>
           </a:prstGeom>
           <a:solidFill>
-            <a:schemeClr val="accent2"/>
+            <a:schemeClr val="accent4"/>
           </a:solidFill>
           <a:ln>
             <a:noFill/>
           </a:ln>
-          <a:scene3d>
-            <a:camera prst="isometricOffAxis1Left"/>
-            <a:lightRig rig="balanced" dir="t"/>
-          </a:scene3d>
-          <a:sp3d extrusionH="381000">
-            <a:extrusionClr>
-              <a:schemeClr val="accent2"/>
-            </a:extrusionClr>
-          </a:sp3d>
         </p:spPr>
         <p:style>
           <a:lnRef idx="2">
@@ -3926,20 +3789,20 @@
           <a:lstStyle/>
           <a:p>
             <a:pPr algn="ctr"/>
-            <a:endParaRPr lang="en-US"/>
-          </a:p>
-        </p:txBody>
-      </p:sp>
-      <p:sp>
-        <p:nvSpPr>
-          <p:cNvPr id="12" name="TextBox 11"/>
+            <a:endParaRPr lang="ko-KR" altLang="en-US"/>
+          </a:p>
+        </p:txBody>
+      </p:sp>
+      <p:sp>
+        <p:nvSpPr>
+          <p:cNvPr id="11" name="TextBox 10"/>
           <p:cNvSpPr txBox="1"/>
           <p:nvPr/>
         </p:nvSpPr>
         <p:spPr>
           <a:xfrm>
-            <a:off x="6442884" y="5740397"/>
-            <a:ext cx="761491" cy="369332"/>
+            <a:off x="5553867" y="535831"/>
+            <a:ext cx="742511" cy="369332"/>
           </a:xfrm>
           <a:prstGeom prst="rect">
             <a:avLst/>
@@ -3954,41 +3817,99 @@
           <a:p>
             <a:pPr algn="ctr"/>
             <a:r>
+              <a:rPr lang="en-US" dirty="0"/>
+              <a:t>z</a:t>
+            </a:r>
+            <a:r>
               <a:rPr lang="en-US" dirty="0" smtClean="0"/>
-              <a:t>FC: 64</a:t>
-            </a:r>
-          </a:p>
-        </p:txBody>
-      </p:sp>
-      <p:sp>
-        <p:nvSpPr>
-          <p:cNvPr id="13" name="Rectangle 12"/>
+              <a:t>: 100</a:t>
+            </a:r>
+            <a:endParaRPr lang="en-US" dirty="0"/>
+          </a:p>
+        </p:txBody>
+      </p:sp>
+      <p:sp>
+        <p:nvSpPr>
+          <p:cNvPr id="12" name="TextBox 11"/>
+          <p:cNvSpPr txBox="1"/>
+          <p:nvPr/>
+        </p:nvSpPr>
+        <p:spPr>
+          <a:xfrm>
+            <a:off x="5657260" y="1304885"/>
+            <a:ext cx="535723" cy="369332"/>
+          </a:xfrm>
+          <a:prstGeom prst="rect">
+            <a:avLst/>
+          </a:prstGeom>
+          <a:noFill/>
+        </p:spPr>
+        <p:txBody>
+          <a:bodyPr wrap="none" rtlCol="0">
+            <a:spAutoFit/>
+          </a:bodyPr>
+          <a:lstStyle/>
+          <a:p>
+            <a:pPr algn="ctr"/>
+            <a:r>
+              <a:rPr lang="en-US" dirty="0" smtClean="0"/>
+              <a:t>128</a:t>
+            </a:r>
+            <a:endParaRPr lang="en-US" dirty="0" smtClean="0"/>
+          </a:p>
+        </p:txBody>
+      </p:sp>
+      <p:sp>
+        <p:nvSpPr>
+          <p:cNvPr id="23" name="TextBox 22"/>
+          <p:cNvSpPr txBox="1"/>
+          <p:nvPr/>
+        </p:nvSpPr>
+        <p:spPr>
+          <a:xfrm>
+            <a:off x="5703713" y="2027702"/>
+            <a:ext cx="418704" cy="369332"/>
+          </a:xfrm>
+          <a:prstGeom prst="rect">
+            <a:avLst/>
+          </a:prstGeom>
+          <a:noFill/>
+        </p:spPr>
+        <p:txBody>
+          <a:bodyPr wrap="none" rtlCol="0">
+            <a:spAutoFit/>
+          </a:bodyPr>
+          <a:lstStyle/>
+          <a:p>
+            <a:pPr algn="ctr"/>
+            <a:r>
+              <a:rPr lang="en-US" dirty="0" smtClean="0"/>
+              <a:t>32</a:t>
+            </a:r>
+            <a:endParaRPr lang="en-US" dirty="0" smtClean="0"/>
+          </a:p>
+        </p:txBody>
+      </p:sp>
+      <p:sp>
+        <p:nvSpPr>
+          <p:cNvPr id="24" name="정육면체 23"/>
           <p:cNvSpPr/>
           <p:nvPr/>
         </p:nvSpPr>
         <p:spPr>
           <a:xfrm>
-            <a:off x="7493776" y="2760132"/>
-            <a:ext cx="444500" cy="1278468"/>
-          </a:xfrm>
-          <a:prstGeom prst="rect">
+            <a:off x="3394359" y="2653533"/>
+            <a:ext cx="5061524" cy="517236"/>
+          </a:xfrm>
+          <a:prstGeom prst="cube">
             <a:avLst/>
           </a:prstGeom>
           <a:solidFill>
-            <a:schemeClr val="accent4"/>
+            <a:schemeClr val="accent2"/>
           </a:solidFill>
           <a:ln>
             <a:noFill/>
           </a:ln>
-          <a:scene3d>
-            <a:camera prst="isometricOffAxis1Left"/>
-            <a:lightRig rig="balanced" dir="t"/>
-          </a:scene3d>
-          <a:sp3d extrusionH="381000">
-            <a:extrusionClr>
-              <a:schemeClr val="accent4"/>
-            </a:extrusionClr>
-          </a:sp3d>
         </p:spPr>
         <p:style>
           <a:lnRef idx="2">
@@ -4011,20 +3932,20 @@
           <a:lstStyle/>
           <a:p>
             <a:pPr algn="ctr"/>
-            <a:endParaRPr lang="en-US"/>
-          </a:p>
-        </p:txBody>
-      </p:sp>
-      <p:sp>
-        <p:nvSpPr>
-          <p:cNvPr id="14" name="TextBox 13"/>
+            <a:endParaRPr lang="ko-KR" altLang="en-US"/>
+          </a:p>
+        </p:txBody>
+      </p:sp>
+      <p:sp>
+        <p:nvSpPr>
+          <p:cNvPr id="25" name="TextBox 24"/>
           <p:cNvSpPr txBox="1"/>
           <p:nvPr/>
         </p:nvSpPr>
         <p:spPr>
           <a:xfrm>
-            <a:off x="7533043" y="5740397"/>
-            <a:ext cx="716863" cy="646331"/>
+            <a:off x="5657259" y="2801437"/>
+            <a:ext cx="535724" cy="369332"/>
           </a:xfrm>
           <a:prstGeom prst="rect">
             <a:avLst/>
@@ -4040,14 +3961,7 @@
             <a:pPr algn="ctr"/>
             <a:r>
               <a:rPr lang="en-US" dirty="0" smtClean="0"/>
-              <a:t>Leaky</a:t>
-            </a:r>
-          </a:p>
-          <a:p>
-            <a:pPr algn="ctr"/>
-            <a:r>
-              <a:rPr lang="en-US" dirty="0" err="1" smtClean="0"/>
-              <a:t>ReLU</a:t>
+              <a:t>784</a:t>
             </a:r>
             <a:endParaRPr lang="en-US" dirty="0" smtClean="0"/>
           </a:p>
@@ -4055,33 +3969,24 @@
       </p:sp>
       <p:sp>
         <p:nvSpPr>
-          <p:cNvPr id="15" name="Rectangle 14"/>
+          <p:cNvPr id="26" name="정육면체 25"/>
           <p:cNvSpPr/>
           <p:nvPr/>
         </p:nvSpPr>
         <p:spPr>
           <a:xfrm>
-            <a:off x="9119407" y="973666"/>
-            <a:ext cx="444500" cy="4605867"/>
-          </a:xfrm>
-          <a:prstGeom prst="rect">
+            <a:off x="8405091" y="2653533"/>
+            <a:ext cx="369455" cy="517236"/>
+          </a:xfrm>
+          <a:prstGeom prst="cube">
             <a:avLst/>
           </a:prstGeom>
           <a:solidFill>
-            <a:schemeClr val="accent2"/>
+            <a:schemeClr val="accent6"/>
           </a:solidFill>
           <a:ln>
             <a:noFill/>
           </a:ln>
-          <a:scene3d>
-            <a:camera prst="isometricOffAxis1Left"/>
-            <a:lightRig rig="balanced" dir="t"/>
-          </a:scene3d>
-          <a:sp3d extrusionH="381000">
-            <a:extrusionClr>
-              <a:schemeClr val="accent2"/>
-            </a:extrusionClr>
-          </a:sp3d>
         </p:spPr>
         <p:style>
           <a:lnRef idx="2">
@@ -4104,20 +4009,20 @@
           <a:lstStyle/>
           <a:p>
             <a:pPr algn="ctr"/>
-            <a:endParaRPr lang="en-US"/>
-          </a:p>
-        </p:txBody>
-      </p:sp>
-      <p:sp>
-        <p:nvSpPr>
-          <p:cNvPr id="16" name="TextBox 15"/>
+            <a:endParaRPr lang="ko-KR" altLang="en-US"/>
+          </a:p>
+        </p:txBody>
+      </p:sp>
+      <p:sp>
+        <p:nvSpPr>
+          <p:cNvPr id="29" name="TextBox 28"/>
           <p:cNvSpPr txBox="1"/>
           <p:nvPr/>
         </p:nvSpPr>
         <p:spPr>
           <a:xfrm>
-            <a:off x="9117897" y="5740397"/>
-            <a:ext cx="878509" cy="369332"/>
+            <a:off x="3238679" y="-92009"/>
+            <a:ext cx="832279" cy="1323439"/>
           </a:xfrm>
           <a:prstGeom prst="rect">
             <a:avLst/>
@@ -4130,43 +4035,35 @@
           </a:bodyPr>
           <a:lstStyle/>
           <a:p>
-            <a:pPr algn="ctr"/>
-            <a:r>
-              <a:rPr lang="en-US" dirty="0" smtClean="0"/>
-              <a:t>FC: 728</a:t>
-            </a:r>
-          </a:p>
-        </p:txBody>
-      </p:sp>
-      <p:sp>
-        <p:nvSpPr>
-          <p:cNvPr id="17" name="Rectangle 16"/>
+            <a:r>
+              <a:rPr lang="en-US" sz="8000" b="1" i="1" dirty="0" smtClean="0"/>
+              <a:t>G</a:t>
+            </a:r>
+            <a:endParaRPr lang="en-US" sz="8000" b="1" i="1" dirty="0"/>
+          </a:p>
+        </p:txBody>
+      </p:sp>
+      <p:sp>
+        <p:nvSpPr>
+          <p:cNvPr id="30" name="Rectangle 19"/>
           <p:cNvSpPr/>
           <p:nvPr/>
         </p:nvSpPr>
         <p:spPr>
           <a:xfrm>
-            <a:off x="10171364" y="999066"/>
-            <a:ext cx="444500" cy="4605867"/>
-          </a:xfrm>
-          <a:prstGeom prst="rect">
-            <a:avLst/>
-          </a:prstGeom>
-          <a:solidFill>
-            <a:schemeClr val="accent6"/>
-          </a:solidFill>
+            <a:off x="3238679" y="84667"/>
+            <a:ext cx="5729828" cy="3295842"/>
+          </a:xfrm>
+          <a:prstGeom prst="rect">
+            <a:avLst/>
+          </a:prstGeom>
+          <a:noFill/>
           <a:ln>
-            <a:noFill/>
+            <a:solidFill>
+              <a:schemeClr val="tx1"/>
+            </a:solidFill>
+            <a:prstDash val="dash"/>
           </a:ln>
-          <a:scene3d>
-            <a:camera prst="isometricOffAxis1Left"/>
-            <a:lightRig rig="balanced" dir="t"/>
-          </a:scene3d>
-          <a:sp3d extrusionH="381000">
-            <a:extrusionClr>
-              <a:schemeClr val="accent6"/>
-            </a:extrusionClr>
-          </a:sp3d>
         </p:spPr>
         <p:style>
           <a:lnRef idx="2">
@@ -4195,14 +4092,62 @@
       </p:sp>
       <p:sp>
         <p:nvSpPr>
-          <p:cNvPr id="18" name="TextBox 17"/>
+          <p:cNvPr id="41" name="정육면체 40"/>
+          <p:cNvSpPr/>
+          <p:nvPr/>
+        </p:nvSpPr>
+        <p:spPr>
+          <a:xfrm>
+            <a:off x="3394359" y="3711995"/>
+            <a:ext cx="5061524" cy="517236"/>
+          </a:xfrm>
+          <a:prstGeom prst="cube">
+            <a:avLst/>
+          </a:prstGeom>
+          <a:solidFill>
+            <a:schemeClr val="bg1">
+              <a:lumMod val="65000"/>
+            </a:schemeClr>
+          </a:solidFill>
+          <a:ln>
+            <a:noFill/>
+          </a:ln>
+        </p:spPr>
+        <p:style>
+          <a:lnRef idx="2">
+            <a:schemeClr val="accent1">
+              <a:shade val="50000"/>
+            </a:schemeClr>
+          </a:lnRef>
+          <a:fillRef idx="1">
+            <a:schemeClr val="accent1"/>
+          </a:fillRef>
+          <a:effectRef idx="0">
+            <a:schemeClr val="accent1"/>
+          </a:effectRef>
+          <a:fontRef idx="minor">
+            <a:schemeClr val="lt1"/>
+          </a:fontRef>
+        </p:style>
+        <p:txBody>
+          <a:bodyPr rtlCol="0" anchor="ctr"/>
+          <a:lstStyle/>
+          <a:p>
+            <a:pPr algn="ctr"/>
+            <a:endParaRPr lang="ko-KR" altLang="en-US"/>
+          </a:p>
+        </p:txBody>
+      </p:sp>
+      <p:sp>
+        <p:nvSpPr>
+          <p:cNvPr id="42" name="TextBox 41"/>
           <p:cNvSpPr txBox="1"/>
           <p:nvPr/>
         </p:nvSpPr>
         <p:spPr>
           <a:xfrm>
-            <a:off x="10318438" y="5740397"/>
-            <a:ext cx="613117" cy="369332"/>
+            <a:off x="5549860" y="3845945"/>
+            <a:ext cx="750526" cy="369332"/>
           </a:xfrm>
           <a:prstGeom prst="rect">
             <a:avLst/>
@@ -4217,8 +4162,8 @@
           <a:p>
             <a:pPr algn="ctr"/>
             <a:r>
-              <a:rPr lang="en-US" dirty="0" err="1" smtClean="0"/>
-              <a:t>tanh</a:t>
+              <a:rPr lang="en-US" dirty="0" smtClean="0"/>
+              <a:t>x: 784</a:t>
             </a:r>
             <a:endParaRPr lang="en-US" dirty="0" smtClean="0"/>
           </a:p>
@@ -4226,14 +4171,44 @@
       </p:sp>
       <p:sp>
         <p:nvSpPr>
-          <p:cNvPr id="20" name="Rectangle 19"/>
+          <p:cNvPr id="44" name="TextBox 43"/>
+          <p:cNvSpPr txBox="1"/>
+          <p:nvPr/>
+        </p:nvSpPr>
+        <p:spPr>
+          <a:xfrm>
+            <a:off x="3238679" y="3333204"/>
+            <a:ext cx="830677" cy="1323439"/>
+          </a:xfrm>
+          <a:prstGeom prst="rect">
+            <a:avLst/>
+          </a:prstGeom>
+          <a:noFill/>
+        </p:spPr>
+        <p:txBody>
+          <a:bodyPr wrap="none" rtlCol="0">
+            <a:spAutoFit/>
+          </a:bodyPr>
+          <a:lstStyle/>
+          <a:p>
+            <a:r>
+              <a:rPr lang="en-US" sz="8000" b="1" i="1" dirty="0"/>
+              <a:t>D</a:t>
+            </a:r>
+            <a:endParaRPr lang="en-US" sz="8000" b="1" i="1" dirty="0"/>
+          </a:p>
+        </p:txBody>
+      </p:sp>
+      <p:sp>
+        <p:nvSpPr>
+          <p:cNvPr id="45" name="Rectangle 19"/>
           <p:cNvSpPr/>
           <p:nvPr/>
         </p:nvSpPr>
         <p:spPr>
           <a:xfrm>
-            <a:off x="1473195" y="592667"/>
-            <a:ext cx="1173487" cy="5794061"/>
+            <a:off x="3238679" y="3509880"/>
+            <a:ext cx="5729828" cy="3295842"/>
           </a:xfrm>
           <a:prstGeom prst="rect">
             <a:avLst/>
@@ -4273,24 +4248,23 @@
       </p:sp>
       <p:sp>
         <p:nvSpPr>
-          <p:cNvPr id="21" name="Rectangle 20"/>
+          <p:cNvPr id="46" name="정육면체 45"/>
           <p:cNvSpPr/>
           <p:nvPr/>
         </p:nvSpPr>
         <p:spPr>
           <a:xfrm>
-            <a:off x="3353186" y="592666"/>
-            <a:ext cx="2163198" cy="5794061"/>
-          </a:xfrm>
-          <a:prstGeom prst="rect">
-            <a:avLst/>
-          </a:prstGeom>
-          <a:noFill/>
+            <a:off x="4380340" y="4467197"/>
+            <a:ext cx="3089562" cy="517236"/>
+          </a:xfrm>
+          <a:prstGeom prst="cube">
+            <a:avLst/>
+          </a:prstGeom>
+          <a:solidFill>
+            <a:schemeClr val="accent2"/>
+          </a:solidFill>
           <a:ln>
-            <a:solidFill>
-              <a:schemeClr val="tx1"/>
-            </a:solidFill>
-            <a:prstDash val="dash"/>
+            <a:noFill/>
           </a:ln>
         </p:spPr>
         <p:style>
@@ -4314,30 +4288,29 @@
           <a:lstStyle/>
           <a:p>
             <a:pPr algn="ctr"/>
-            <a:endParaRPr lang="en-US"/>
-          </a:p>
-        </p:txBody>
-      </p:sp>
-      <p:sp>
-        <p:nvSpPr>
-          <p:cNvPr id="22" name="Rectangle 21"/>
+            <a:endParaRPr lang="ko-KR" altLang="en-US"/>
+          </a:p>
+        </p:txBody>
+      </p:sp>
+      <p:sp>
+        <p:nvSpPr>
+          <p:cNvPr id="47" name="정육면체 46"/>
           <p:cNvSpPr/>
           <p:nvPr/>
         </p:nvSpPr>
         <p:spPr>
           <a:xfrm>
-            <a:off x="6235099" y="592665"/>
-            <a:ext cx="2163198" cy="5794061"/>
-          </a:xfrm>
-          <a:prstGeom prst="rect">
-            <a:avLst/>
-          </a:prstGeom>
-          <a:noFill/>
+            <a:off x="7426036" y="4467197"/>
+            <a:ext cx="369455" cy="517236"/>
+          </a:xfrm>
+          <a:prstGeom prst="cube">
+            <a:avLst/>
+          </a:prstGeom>
+          <a:solidFill>
+            <a:schemeClr val="accent4"/>
+          </a:solidFill>
           <a:ln>
-            <a:solidFill>
-              <a:schemeClr val="tx1"/>
-            </a:solidFill>
-            <a:prstDash val="dash"/>
+            <a:noFill/>
           </a:ln>
         </p:spPr>
         <p:style>
@@ -4361,30 +4334,60 @@
           <a:lstStyle/>
           <a:p>
             <a:pPr algn="ctr"/>
-            <a:endParaRPr lang="en-US"/>
-          </a:p>
-        </p:txBody>
-      </p:sp>
-      <p:sp>
-        <p:nvSpPr>
-          <p:cNvPr id="23" name="Rectangle 22"/>
+            <a:endParaRPr lang="ko-KR" altLang="en-US"/>
+          </a:p>
+        </p:txBody>
+      </p:sp>
+      <p:sp>
+        <p:nvSpPr>
+          <p:cNvPr id="48" name="TextBox 47"/>
+          <p:cNvSpPr txBox="1"/>
+          <p:nvPr/>
+        </p:nvSpPr>
+        <p:spPr>
+          <a:xfrm>
+            <a:off x="5657260" y="4628953"/>
+            <a:ext cx="535723" cy="369332"/>
+          </a:xfrm>
+          <a:prstGeom prst="rect">
+            <a:avLst/>
+          </a:prstGeom>
+          <a:noFill/>
+        </p:spPr>
+        <p:txBody>
+          <a:bodyPr wrap="none" rtlCol="0">
+            <a:spAutoFit/>
+          </a:bodyPr>
+          <a:lstStyle/>
+          <a:p>
+            <a:pPr algn="ctr"/>
+            <a:r>
+              <a:rPr lang="en-US" dirty="0" smtClean="0"/>
+              <a:t>128</a:t>
+            </a:r>
+            <a:endParaRPr lang="en-US" dirty="0" smtClean="0"/>
+          </a:p>
+        </p:txBody>
+      </p:sp>
+      <p:sp>
+        <p:nvSpPr>
+          <p:cNvPr id="49" name="정육면체 48"/>
           <p:cNvSpPr/>
           <p:nvPr/>
         </p:nvSpPr>
         <p:spPr>
           <a:xfrm>
-            <a:off x="8923204" y="592664"/>
-            <a:ext cx="2163198" cy="5794061"/>
-          </a:xfrm>
-          <a:prstGeom prst="rect">
-            <a:avLst/>
-          </a:prstGeom>
-          <a:noFill/>
+            <a:off x="5401605" y="5222399"/>
+            <a:ext cx="1022925" cy="517236"/>
+          </a:xfrm>
+          <a:prstGeom prst="cube">
+            <a:avLst/>
+          </a:prstGeom>
+          <a:solidFill>
+            <a:schemeClr val="accent2"/>
+          </a:solidFill>
           <a:ln>
-            <a:solidFill>
-              <a:schemeClr val="tx1"/>
-            </a:solidFill>
-            <a:prstDash val="dash"/>
+            <a:noFill/>
           </a:ln>
         </p:spPr>
         <p:style>
@@ -4408,20 +4411,66 @@
           <a:lstStyle/>
           <a:p>
             <a:pPr algn="ctr"/>
-            <a:endParaRPr lang="en-US"/>
-          </a:p>
-        </p:txBody>
-      </p:sp>
-      <p:sp>
-        <p:nvSpPr>
-          <p:cNvPr id="24" name="TextBox 23"/>
+            <a:endParaRPr lang="ko-KR" altLang="en-US"/>
+          </a:p>
+        </p:txBody>
+      </p:sp>
+      <p:sp>
+        <p:nvSpPr>
+          <p:cNvPr id="50" name="정육면체 49"/>
+          <p:cNvSpPr/>
+          <p:nvPr/>
+        </p:nvSpPr>
+        <p:spPr>
+          <a:xfrm>
+            <a:off x="6374883" y="5222399"/>
+            <a:ext cx="369455" cy="517236"/>
+          </a:xfrm>
+          <a:prstGeom prst="cube">
+            <a:avLst/>
+          </a:prstGeom>
+          <a:solidFill>
+            <a:schemeClr val="accent4"/>
+          </a:solidFill>
+          <a:ln>
+            <a:noFill/>
+          </a:ln>
+        </p:spPr>
+        <p:style>
+          <a:lnRef idx="2">
+            <a:schemeClr val="accent1">
+              <a:shade val="50000"/>
+            </a:schemeClr>
+          </a:lnRef>
+          <a:fillRef idx="1">
+            <a:schemeClr val="accent1"/>
+          </a:fillRef>
+          <a:effectRef idx="0">
+            <a:schemeClr val="accent1"/>
+          </a:effectRef>
+          <a:fontRef idx="minor">
+            <a:schemeClr val="lt1"/>
+          </a:fontRef>
+        </p:style>
+        <p:txBody>
+          <a:bodyPr rtlCol="0" anchor="ctr"/>
+          <a:lstStyle/>
+          <a:p>
+            <a:pPr algn="ctr"/>
+            <a:endParaRPr lang="ko-KR" altLang="en-US"/>
+          </a:p>
+        </p:txBody>
+      </p:sp>
+      <p:sp>
+        <p:nvSpPr>
+          <p:cNvPr id="51" name="TextBox 50"/>
           <p:cNvSpPr txBox="1"/>
           <p:nvPr/>
         </p:nvSpPr>
         <p:spPr>
           <a:xfrm>
-            <a:off x="304800" y="304800"/>
-            <a:ext cx="832279" cy="1323439"/>
+            <a:off x="5703713" y="5351770"/>
+            <a:ext cx="418704" cy="369332"/>
           </a:xfrm>
           <a:prstGeom prst="rect">
             <a:avLst/>
@@ -4434,18 +4483,580 @@
           </a:bodyPr>
           <a:lstStyle/>
           <a:p>
-            <a:r>
-              <a:rPr lang="en-US" sz="8000" b="1" i="1" smtClean="0"/>
-              <a:t>G</a:t>
-            </a:r>
-            <a:endParaRPr lang="en-US" sz="8000" b="1" i="1"/>
+            <a:pPr algn="ctr"/>
+            <a:r>
+              <a:rPr lang="en-US" dirty="0" smtClean="0"/>
+              <a:t>64</a:t>
+            </a:r>
+            <a:endParaRPr lang="en-US" dirty="0" smtClean="0"/>
+          </a:p>
+        </p:txBody>
+      </p:sp>
+      <p:sp>
+        <p:nvSpPr>
+          <p:cNvPr id="52" name="정육면체 51"/>
+          <p:cNvSpPr/>
+          <p:nvPr/>
+        </p:nvSpPr>
+        <p:spPr>
+          <a:xfrm>
+            <a:off x="5703714" y="5963749"/>
+            <a:ext cx="489270" cy="517236"/>
+          </a:xfrm>
+          <a:prstGeom prst="cube">
+            <a:avLst/>
+          </a:prstGeom>
+          <a:solidFill>
+            <a:schemeClr val="accent2"/>
+          </a:solidFill>
+          <a:ln>
+            <a:noFill/>
+          </a:ln>
+        </p:spPr>
+        <p:style>
+          <a:lnRef idx="2">
+            <a:schemeClr val="accent1">
+              <a:shade val="50000"/>
+            </a:schemeClr>
+          </a:lnRef>
+          <a:fillRef idx="1">
+            <a:schemeClr val="accent1"/>
+          </a:fillRef>
+          <a:effectRef idx="0">
+            <a:schemeClr val="accent1"/>
+          </a:effectRef>
+          <a:fontRef idx="minor">
+            <a:schemeClr val="lt1"/>
+          </a:fontRef>
+        </p:style>
+        <p:txBody>
+          <a:bodyPr rtlCol="0" anchor="ctr"/>
+          <a:lstStyle/>
+          <a:p>
+            <a:pPr algn="ctr"/>
+            <a:endParaRPr lang="ko-KR" altLang="en-US"/>
+          </a:p>
+        </p:txBody>
+      </p:sp>
+      <p:sp>
+        <p:nvSpPr>
+          <p:cNvPr id="53" name="정육면체 52"/>
+          <p:cNvSpPr/>
+          <p:nvPr/>
+        </p:nvSpPr>
+        <p:spPr>
+          <a:xfrm>
+            <a:off x="6171683" y="5977601"/>
+            <a:ext cx="369455" cy="517236"/>
+          </a:xfrm>
+          <a:prstGeom prst="cube">
+            <a:avLst/>
+          </a:prstGeom>
+          <a:solidFill>
+            <a:schemeClr val="accent1"/>
+          </a:solidFill>
+          <a:ln>
+            <a:noFill/>
+          </a:ln>
+        </p:spPr>
+        <p:style>
+          <a:lnRef idx="2">
+            <a:schemeClr val="accent1">
+              <a:shade val="50000"/>
+            </a:schemeClr>
+          </a:lnRef>
+          <a:fillRef idx="1">
+            <a:schemeClr val="accent1"/>
+          </a:fillRef>
+          <a:effectRef idx="0">
+            <a:schemeClr val="accent1"/>
+          </a:effectRef>
+          <a:fontRef idx="minor">
+            <a:schemeClr val="lt1"/>
+          </a:fontRef>
+        </p:style>
+        <p:txBody>
+          <a:bodyPr rtlCol="0" anchor="ctr"/>
+          <a:lstStyle/>
+          <a:p>
+            <a:pPr algn="ctr"/>
+            <a:endParaRPr lang="ko-KR" altLang="en-US"/>
+          </a:p>
+        </p:txBody>
+      </p:sp>
+      <p:sp>
+        <p:nvSpPr>
+          <p:cNvPr id="54" name="TextBox 53"/>
+          <p:cNvSpPr txBox="1"/>
+          <p:nvPr/>
+        </p:nvSpPr>
+        <p:spPr>
+          <a:xfrm>
+            <a:off x="5762221" y="6093120"/>
+            <a:ext cx="301686" cy="369332"/>
+          </a:xfrm>
+          <a:prstGeom prst="rect">
+            <a:avLst/>
+          </a:prstGeom>
+          <a:noFill/>
+        </p:spPr>
+        <p:txBody>
+          <a:bodyPr wrap="none" rtlCol="0">
+            <a:spAutoFit/>
+          </a:bodyPr>
+          <a:lstStyle/>
+          <a:p>
+            <a:pPr algn="ctr"/>
+            <a:r>
+              <a:rPr lang="en-US" dirty="0"/>
+              <a:t>1</a:t>
+            </a:r>
+            <a:endParaRPr lang="en-US" dirty="0" smtClean="0"/>
+          </a:p>
+        </p:txBody>
+      </p:sp>
+      <p:grpSp>
+        <p:nvGrpSpPr>
+          <p:cNvPr id="57" name="그룹 56"/>
+          <p:cNvGrpSpPr/>
+          <p:nvPr/>
+        </p:nvGrpSpPr>
+        <p:grpSpPr>
+          <a:xfrm>
+            <a:off x="9193647" y="2563964"/>
+            <a:ext cx="1255364" cy="1891832"/>
+            <a:chOff x="10226850" y="592668"/>
+            <a:chExt cx="1255364" cy="1891832"/>
+          </a:xfrm>
+        </p:grpSpPr>
+        <p:sp>
+          <p:nvSpPr>
+            <p:cNvPr id="13" name="TextBox 12"/>
+            <p:cNvSpPr txBox="1"/>
+            <p:nvPr/>
+          </p:nvSpPr>
+          <p:spPr>
+            <a:xfrm>
+              <a:off x="10828274" y="592668"/>
+              <a:ext cx="518092" cy="430887"/>
+            </a:xfrm>
+            <a:prstGeom prst="rect">
+              <a:avLst/>
+            </a:prstGeom>
+            <a:noFill/>
+          </p:spPr>
+          <p:txBody>
+            <a:bodyPr wrap="none" rtlCol="0">
+              <a:spAutoFit/>
+            </a:bodyPr>
+            <a:lstStyle/>
+            <a:p>
+              <a:pPr algn="ctr"/>
+              <a:r>
+                <a:rPr lang="en-US" sz="1100" b="1" dirty="0" smtClean="0"/>
+                <a:t>Leaky</a:t>
+              </a:r>
+            </a:p>
+            <a:p>
+              <a:pPr algn="ctr"/>
+              <a:r>
+                <a:rPr lang="en-US" sz="1100" b="1" dirty="0" err="1" smtClean="0"/>
+                <a:t>ReLU</a:t>
+              </a:r>
+              <a:endParaRPr lang="en-US" sz="1100" b="1" dirty="0" smtClean="0"/>
+            </a:p>
+          </p:txBody>
+        </p:sp>
+        <p:sp>
+          <p:nvSpPr>
+            <p:cNvPr id="19" name="정육면체 18"/>
+            <p:cNvSpPr/>
+            <p:nvPr/>
+          </p:nvSpPr>
+          <p:spPr>
+            <a:xfrm>
+              <a:off x="10226850" y="614148"/>
+              <a:ext cx="387928" cy="387928"/>
+            </a:xfrm>
+            <a:prstGeom prst="cube">
+              <a:avLst/>
+            </a:prstGeom>
+            <a:solidFill>
+              <a:schemeClr val="accent4"/>
+            </a:solidFill>
+            <a:ln>
+              <a:noFill/>
+            </a:ln>
+          </p:spPr>
+          <p:style>
+            <a:lnRef idx="2">
+              <a:schemeClr val="accent1">
+                <a:shade val="50000"/>
+              </a:schemeClr>
+            </a:lnRef>
+            <a:fillRef idx="1">
+              <a:schemeClr val="accent1"/>
+            </a:fillRef>
+            <a:effectRef idx="0">
+              <a:schemeClr val="accent1"/>
+            </a:effectRef>
+            <a:fontRef idx="minor">
+              <a:schemeClr val="lt1"/>
+            </a:fontRef>
+          </p:style>
+          <p:txBody>
+            <a:bodyPr rtlCol="0" anchor="ctr"/>
+            <a:lstStyle/>
+            <a:p>
+              <a:pPr algn="ctr"/>
+              <a:endParaRPr lang="ko-KR" altLang="en-US"/>
+            </a:p>
+          </p:txBody>
+        </p:sp>
+        <p:sp>
+          <p:nvSpPr>
+            <p:cNvPr id="20" name="정육면체 19"/>
+            <p:cNvSpPr/>
+            <p:nvPr/>
+          </p:nvSpPr>
+          <p:spPr>
+            <a:xfrm>
+              <a:off x="10226850" y="1122149"/>
+              <a:ext cx="387928" cy="387928"/>
+            </a:xfrm>
+            <a:prstGeom prst="cube">
+              <a:avLst/>
+            </a:prstGeom>
+            <a:solidFill>
+              <a:schemeClr val="accent2"/>
+            </a:solidFill>
+            <a:ln>
+              <a:noFill/>
+            </a:ln>
+          </p:spPr>
+          <p:style>
+            <a:lnRef idx="2">
+              <a:schemeClr val="accent1">
+                <a:shade val="50000"/>
+              </a:schemeClr>
+            </a:lnRef>
+            <a:fillRef idx="1">
+              <a:schemeClr val="accent1"/>
+            </a:fillRef>
+            <a:effectRef idx="0">
+              <a:schemeClr val="accent1"/>
+            </a:effectRef>
+            <a:fontRef idx="minor">
+              <a:schemeClr val="lt1"/>
+            </a:fontRef>
+          </p:style>
+          <p:txBody>
+            <a:bodyPr rtlCol="0" anchor="ctr"/>
+            <a:lstStyle/>
+            <a:p>
+              <a:pPr algn="ctr"/>
+              <a:endParaRPr lang="ko-KR" altLang="en-US"/>
+            </a:p>
+          </p:txBody>
+        </p:sp>
+        <p:sp>
+          <p:nvSpPr>
+            <p:cNvPr id="22" name="TextBox 21"/>
+            <p:cNvSpPr txBox="1"/>
+            <p:nvPr/>
+          </p:nvSpPr>
+          <p:spPr>
+            <a:xfrm>
+              <a:off x="10686803" y="1100669"/>
+              <a:ext cx="795411" cy="430887"/>
+            </a:xfrm>
+            <a:prstGeom prst="rect">
+              <a:avLst/>
+            </a:prstGeom>
+            <a:noFill/>
+          </p:spPr>
+          <p:txBody>
+            <a:bodyPr wrap="none" rtlCol="0">
+              <a:spAutoFit/>
+            </a:bodyPr>
+            <a:lstStyle/>
+            <a:p>
+              <a:pPr algn="ctr"/>
+              <a:r>
+                <a:rPr lang="en-US" altLang="ko-KR" sz="1100" b="1" dirty="0" smtClean="0"/>
+                <a:t>Fully</a:t>
+              </a:r>
+              <a:r>
+                <a:rPr lang="ko-KR" altLang="en-US" sz="1100" b="1" dirty="0" smtClean="0"/>
+                <a:t> </a:t>
+              </a:r>
+              <a:endParaRPr lang="en-US" altLang="ko-KR" sz="1100" b="1" dirty="0" smtClean="0"/>
+            </a:p>
+            <a:p>
+              <a:pPr algn="ctr"/>
+              <a:r>
+                <a:rPr lang="en-US" sz="1100" b="1" dirty="0" smtClean="0"/>
+                <a:t>connected</a:t>
+              </a:r>
+              <a:endParaRPr lang="en-US" sz="1100" b="1" dirty="0" smtClean="0"/>
+            </a:p>
+          </p:txBody>
+        </p:sp>
+        <p:sp>
+          <p:nvSpPr>
+            <p:cNvPr id="27" name="정육면체 26"/>
+            <p:cNvSpPr/>
+            <p:nvPr/>
+          </p:nvSpPr>
+          <p:spPr>
+            <a:xfrm>
+              <a:off x="10226850" y="1630150"/>
+              <a:ext cx="387928" cy="387928"/>
+            </a:xfrm>
+            <a:prstGeom prst="cube">
+              <a:avLst/>
+            </a:prstGeom>
+            <a:solidFill>
+              <a:schemeClr val="accent6"/>
+            </a:solidFill>
+            <a:ln>
+              <a:noFill/>
+            </a:ln>
+          </p:spPr>
+          <p:style>
+            <a:lnRef idx="2">
+              <a:schemeClr val="accent1">
+                <a:shade val="50000"/>
+              </a:schemeClr>
+            </a:lnRef>
+            <a:fillRef idx="1">
+              <a:schemeClr val="accent1"/>
+            </a:fillRef>
+            <a:effectRef idx="0">
+              <a:schemeClr val="accent1"/>
+            </a:effectRef>
+            <a:fontRef idx="minor">
+              <a:schemeClr val="lt1"/>
+            </a:fontRef>
+          </p:style>
+          <p:txBody>
+            <a:bodyPr rtlCol="0" anchor="ctr"/>
+            <a:lstStyle/>
+            <a:p>
+              <a:pPr algn="ctr"/>
+              <a:endParaRPr lang="ko-KR" altLang="en-US"/>
+            </a:p>
+          </p:txBody>
+        </p:sp>
+        <p:sp>
+          <p:nvSpPr>
+            <p:cNvPr id="28" name="TextBox 27"/>
+            <p:cNvSpPr txBox="1"/>
+            <p:nvPr/>
+          </p:nvSpPr>
+          <p:spPr>
+            <a:xfrm>
+              <a:off x="10857524" y="1682562"/>
+              <a:ext cx="453970" cy="261610"/>
+            </a:xfrm>
+            <a:prstGeom prst="rect">
+              <a:avLst/>
+            </a:prstGeom>
+            <a:noFill/>
+          </p:spPr>
+          <p:txBody>
+            <a:bodyPr wrap="none" rtlCol="0">
+              <a:spAutoFit/>
+            </a:bodyPr>
+            <a:lstStyle/>
+            <a:p>
+              <a:pPr algn="ctr"/>
+              <a:r>
+                <a:rPr lang="en-US" altLang="ko-KR" sz="1100" b="1" dirty="0" err="1" smtClean="0"/>
+                <a:t>tanh</a:t>
+              </a:r>
+              <a:endParaRPr lang="en-US" sz="1100" b="1" dirty="0" smtClean="0"/>
+            </a:p>
+          </p:txBody>
+        </p:sp>
+        <p:sp>
+          <p:nvSpPr>
+            <p:cNvPr id="55" name="정육면체 54"/>
+            <p:cNvSpPr/>
+            <p:nvPr/>
+          </p:nvSpPr>
+          <p:spPr>
+            <a:xfrm>
+              <a:off x="10226850" y="2096572"/>
+              <a:ext cx="387928" cy="387928"/>
+            </a:xfrm>
+            <a:prstGeom prst="cube">
+              <a:avLst/>
+            </a:prstGeom>
+            <a:solidFill>
+              <a:schemeClr val="accent1"/>
+            </a:solidFill>
+            <a:ln>
+              <a:noFill/>
+            </a:ln>
+          </p:spPr>
+          <p:style>
+            <a:lnRef idx="2">
+              <a:schemeClr val="accent1">
+                <a:shade val="50000"/>
+              </a:schemeClr>
+            </a:lnRef>
+            <a:fillRef idx="1">
+              <a:schemeClr val="accent1"/>
+            </a:fillRef>
+            <a:effectRef idx="0">
+              <a:schemeClr val="accent1"/>
+            </a:effectRef>
+            <a:fontRef idx="minor">
+              <a:schemeClr val="lt1"/>
+            </a:fontRef>
+          </p:style>
+          <p:txBody>
+            <a:bodyPr rtlCol="0" anchor="ctr"/>
+            <a:lstStyle/>
+            <a:p>
+              <a:pPr algn="ctr"/>
+              <a:endParaRPr lang="ko-KR" altLang="en-US"/>
+            </a:p>
+          </p:txBody>
+        </p:sp>
+        <p:sp>
+          <p:nvSpPr>
+            <p:cNvPr id="56" name="TextBox 55"/>
+            <p:cNvSpPr txBox="1"/>
+            <p:nvPr/>
+          </p:nvSpPr>
+          <p:spPr>
+            <a:xfrm>
+              <a:off x="10762146" y="2148984"/>
+              <a:ext cx="644728" cy="261610"/>
+            </a:xfrm>
+            <a:prstGeom prst="rect">
+              <a:avLst/>
+            </a:prstGeom>
+            <a:noFill/>
+          </p:spPr>
+          <p:txBody>
+            <a:bodyPr wrap="none" rtlCol="0">
+              <a:spAutoFit/>
+            </a:bodyPr>
+            <a:lstStyle/>
+            <a:p>
+              <a:pPr algn="ctr"/>
+              <a:r>
+                <a:rPr lang="en-US" altLang="ko-KR" sz="1100" b="1" dirty="0" smtClean="0"/>
+                <a:t>sigmoid</a:t>
+              </a:r>
+              <a:endParaRPr lang="en-US" sz="1100" b="1" dirty="0" smtClean="0"/>
+            </a:p>
+          </p:txBody>
+        </p:sp>
+      </p:grpSp>
+      <p:sp>
+        <p:nvSpPr>
+          <p:cNvPr id="59" name="아래쪽 화살표 58"/>
+          <p:cNvSpPr/>
+          <p:nvPr/>
+        </p:nvSpPr>
+        <p:spPr>
+          <a:xfrm>
+            <a:off x="5606466" y="268674"/>
+            <a:ext cx="637309" cy="3064530"/>
+          </a:xfrm>
+          <a:prstGeom prst="downArrow">
+            <a:avLst/>
+          </a:prstGeom>
+          <a:solidFill>
+            <a:schemeClr val="accent1">
+              <a:alpha val="50000"/>
+            </a:schemeClr>
+          </a:solidFill>
+          <a:ln>
+            <a:noFill/>
+          </a:ln>
+        </p:spPr>
+        <p:style>
+          <a:lnRef idx="2">
+            <a:schemeClr val="accent1">
+              <a:shade val="50000"/>
+            </a:schemeClr>
+          </a:lnRef>
+          <a:fillRef idx="1">
+            <a:schemeClr val="accent1"/>
+          </a:fillRef>
+          <a:effectRef idx="0">
+            <a:schemeClr val="accent1"/>
+          </a:effectRef>
+          <a:fontRef idx="minor">
+            <a:schemeClr val="lt1"/>
+          </a:fontRef>
+        </p:style>
+        <p:txBody>
+          <a:bodyPr rtlCol="0" anchor="ctr"/>
+          <a:lstStyle/>
+          <a:p>
+            <a:pPr algn="ctr"/>
+            <a:endParaRPr lang="ko-KR" altLang="en-US"/>
+          </a:p>
+        </p:txBody>
+      </p:sp>
+      <p:sp>
+        <p:nvSpPr>
+          <p:cNvPr id="60" name="아래쪽 화살표 59"/>
+          <p:cNvSpPr/>
+          <p:nvPr/>
+        </p:nvSpPr>
+        <p:spPr>
+          <a:xfrm>
+            <a:off x="5601402" y="3601446"/>
+            <a:ext cx="637309" cy="3064530"/>
+          </a:xfrm>
+          <a:prstGeom prst="downArrow">
+            <a:avLst/>
+          </a:prstGeom>
+          <a:solidFill>
+            <a:schemeClr val="accent1">
+              <a:alpha val="50000"/>
+            </a:schemeClr>
+          </a:solidFill>
+          <a:ln>
+            <a:noFill/>
+          </a:ln>
+        </p:spPr>
+        <p:style>
+          <a:lnRef idx="2">
+            <a:schemeClr val="accent1">
+              <a:shade val="50000"/>
+            </a:schemeClr>
+          </a:lnRef>
+          <a:fillRef idx="1">
+            <a:schemeClr val="accent1"/>
+          </a:fillRef>
+          <a:effectRef idx="0">
+            <a:schemeClr val="accent1"/>
+          </a:effectRef>
+          <a:fontRef idx="minor">
+            <a:schemeClr val="lt1"/>
+          </a:fontRef>
+        </p:style>
+        <p:txBody>
+          <a:bodyPr rtlCol="0" anchor="ctr"/>
+          <a:lstStyle/>
+          <a:p>
+            <a:pPr algn="ctr"/>
+            <a:endParaRPr lang="ko-KR" altLang="en-US"/>
           </a:p>
         </p:txBody>
       </p:sp>
     </p:spTree>
     <p:extLst>
       <p:ext uri="{BB962C8B-B14F-4D97-AF65-F5344CB8AC3E}">
-        <p14:creationId xmlns:p14="http://schemas.microsoft.com/office/powerpoint/2010/main" val="1193397964"/>
+        <p14:creationId xmlns:p14="http://schemas.microsoft.com/office/powerpoint/2010/main" val="44333304"/>
       </p:ext>
     </p:extLst>
   </p:cSld>
@@ -4528,8 +5139,8 @@
         </p:nvSpPr>
         <p:spPr>
           <a:xfrm>
-            <a:off x="1680628" y="999066"/>
-            <a:ext cx="444500" cy="4580467"/>
+            <a:off x="1680628" y="2353732"/>
+            <a:ext cx="444500" cy="1947335"/>
           </a:xfrm>
           <a:prstGeom prst="rect">
             <a:avLst/>
@@ -4642,8 +5253,8 @@
         </p:nvSpPr>
         <p:spPr>
           <a:xfrm>
-            <a:off x="1675298" y="5740397"/>
-            <a:ext cx="750525" cy="369332"/>
+            <a:off x="1680628" y="5740397"/>
+            <a:ext cx="742511" cy="369332"/>
           </a:xfrm>
           <a:prstGeom prst="rect">
             <a:avLst/>
@@ -4658,12 +5269,12 @@
           <a:p>
             <a:pPr algn="ctr"/>
             <a:r>
+              <a:rPr lang="en-US" dirty="0"/>
+              <a:t>z</a:t>
+            </a:r>
+            <a:r>
               <a:rPr lang="en-US" dirty="0" smtClean="0"/>
-              <a:t>x</a:t>
-            </a:r>
-            <a:r>
-              <a:rPr lang="en-US" smtClean="0"/>
-              <a:t>: 728</a:t>
+              <a:t>: 100</a:t>
             </a:r>
             <a:endParaRPr lang="en-US" dirty="0"/>
           </a:p>
@@ -4978,8 +5589,8 @@
         </p:nvSpPr>
         <p:spPr>
           <a:xfrm>
-            <a:off x="9119407" y="3183467"/>
-            <a:ext cx="444500" cy="558800"/>
+            <a:off x="9119407" y="973666"/>
+            <a:ext cx="444500" cy="4605867"/>
           </a:xfrm>
           <a:prstGeom prst="rect">
             <a:avLst/>
@@ -5033,8 +5644,8 @@
         </p:nvSpPr>
         <p:spPr>
           <a:xfrm>
-            <a:off x="9234915" y="5740397"/>
-            <a:ext cx="644472" cy="369332"/>
+            <a:off x="9117897" y="5740397"/>
+            <a:ext cx="878509" cy="369332"/>
           </a:xfrm>
           <a:prstGeom prst="rect">
             <a:avLst/>
@@ -5050,7 +5661,7 @@
             <a:pPr algn="ctr"/>
             <a:r>
               <a:rPr lang="en-US" dirty="0" smtClean="0"/>
-              <a:t>FC: 1</a:t>
+              <a:t>FC: 728</a:t>
             </a:r>
           </a:p>
         </p:txBody>
@@ -5063,14 +5674,14 @@
         </p:nvSpPr>
         <p:spPr>
           <a:xfrm>
-            <a:off x="10171364" y="3183467"/>
-            <a:ext cx="444500" cy="558800"/>
+            <a:off x="10171364" y="999066"/>
+            <a:ext cx="444500" cy="4605867"/>
           </a:xfrm>
           <a:prstGeom prst="rect">
             <a:avLst/>
           </a:prstGeom>
           <a:solidFill>
-            <a:schemeClr val="accent5"/>
+            <a:schemeClr val="accent6"/>
           </a:solidFill>
           <a:ln>
             <a:noFill/>
@@ -5081,7 +5692,7 @@
           </a:scene3d>
           <a:sp3d extrusionH="381000">
             <a:extrusionClr>
-              <a:schemeClr val="accent5"/>
+              <a:schemeClr val="accent6"/>
             </a:extrusionClr>
           </a:sp3d>
         </p:spPr>
@@ -5118,8 +5729,8 @@
         </p:nvSpPr>
         <p:spPr>
           <a:xfrm>
-            <a:off x="10166377" y="5740397"/>
-            <a:ext cx="917239" cy="369332"/>
+            <a:off x="10318438" y="5740397"/>
+            <a:ext cx="613117" cy="369332"/>
           </a:xfrm>
           <a:prstGeom prst="rect">
             <a:avLst/>
@@ -5134,9 +5745,10 @@
           <a:p>
             <a:pPr algn="ctr"/>
             <a:r>
-              <a:rPr lang="en-US" dirty="0" smtClean="0"/>
-              <a:t>sigmoid</a:t>
-            </a:r>
+              <a:rPr lang="en-US" dirty="0" err="1" smtClean="0"/>
+              <a:t>tanh</a:t>
+            </a:r>
+            <a:endParaRPr lang="en-US" dirty="0" smtClean="0"/>
           </a:p>
         </p:txBody>
       </p:sp>
@@ -5337,7 +5949,7 @@
         <p:spPr>
           <a:xfrm>
             <a:off x="304800" y="304800"/>
-            <a:ext cx="830677" cy="1323439"/>
+            <a:ext cx="832279" cy="1323439"/>
           </a:xfrm>
           <a:prstGeom prst="rect">
             <a:avLst/>
@@ -5351,16 +5963,17 @@
           <a:lstStyle/>
           <a:p>
             <a:r>
-              <a:rPr lang="en-US" sz="8000" b="1" i="1" dirty="0"/>
-              <a:t>D</a:t>
-            </a:r>
+              <a:rPr lang="en-US" sz="8000" b="1" i="1" dirty="0" smtClean="0"/>
+              <a:t>G</a:t>
+            </a:r>
+            <a:endParaRPr lang="en-US" sz="8000" b="1" i="1" dirty="0"/>
           </a:p>
         </p:txBody>
       </p:sp>
     </p:spTree>
     <p:extLst>
       <p:ext uri="{BB962C8B-B14F-4D97-AF65-F5344CB8AC3E}">
-        <p14:creationId xmlns:p14="http://schemas.microsoft.com/office/powerpoint/2010/main" val="1974440172"/>
+        <p14:creationId xmlns:p14="http://schemas.microsoft.com/office/powerpoint/2010/main" val="1193397964"/>
       </p:ext>
     </p:extLst>
   </p:cSld>
@@ -5389,22 +6002,196 @@
       </p:grpSpPr>
       <p:sp>
         <p:nvSpPr>
-          <p:cNvPr id="2" name="Title 1"/>
-          <p:cNvSpPr>
-            <a:spLocks noGrp="1"/>
-          </p:cNvSpPr>
-          <p:nvPr>
-            <p:ph type="title"/>
-          </p:nvPr>
-        </p:nvSpPr>
-        <p:spPr/>
-        <p:txBody>
-          <a:bodyPr/>
-          <a:lstStyle/>
-          <a:p>
+          <p:cNvPr id="25" name="Right Arrow 24"/>
+          <p:cNvSpPr/>
+          <p:nvPr/>
+        </p:nvSpPr>
+        <p:spPr>
+          <a:xfrm>
+            <a:off x="1680628" y="2878667"/>
+            <a:ext cx="10104972" cy="1159932"/>
+          </a:xfrm>
+          <a:prstGeom prst="rightArrow">
+            <a:avLst/>
+          </a:prstGeom>
+          <a:solidFill>
+            <a:schemeClr val="accent1">
+              <a:alpha val="43000"/>
+            </a:schemeClr>
+          </a:solidFill>
+          <a:ln>
+            <a:noFill/>
+          </a:ln>
+        </p:spPr>
+        <p:style>
+          <a:lnRef idx="2">
+            <a:schemeClr val="accent1">
+              <a:shade val="50000"/>
+            </a:schemeClr>
+          </a:lnRef>
+          <a:fillRef idx="1">
+            <a:schemeClr val="accent1"/>
+          </a:fillRef>
+          <a:effectRef idx="0">
+            <a:schemeClr val="accent1"/>
+          </a:effectRef>
+          <a:fontRef idx="minor">
+            <a:schemeClr val="lt1"/>
+          </a:fontRef>
+        </p:style>
+        <p:txBody>
+          <a:bodyPr rtlCol="0" anchor="ctr"/>
+          <a:lstStyle/>
+          <a:p>
+            <a:pPr algn="ctr"/>
+            <a:endParaRPr lang="en-US"/>
+          </a:p>
+        </p:txBody>
+      </p:sp>
+      <p:sp>
+        <p:nvSpPr>
+          <p:cNvPr id="4" name="Rectangle 3"/>
+          <p:cNvSpPr/>
+          <p:nvPr/>
+        </p:nvSpPr>
+        <p:spPr>
+          <a:xfrm>
+            <a:off x="1680628" y="999066"/>
+            <a:ext cx="444500" cy="4580467"/>
+          </a:xfrm>
+          <a:prstGeom prst="rect">
+            <a:avLst/>
+          </a:prstGeom>
+          <a:solidFill>
+            <a:schemeClr val="bg1">
+              <a:lumMod val="50000"/>
+            </a:schemeClr>
+          </a:solidFill>
+          <a:ln>
+            <a:noFill/>
+          </a:ln>
+          <a:scene3d>
+            <a:camera prst="isometricOffAxis1Left"/>
+            <a:lightRig rig="balanced" dir="t"/>
+          </a:scene3d>
+          <a:sp3d extrusionH="381000">
+            <a:extrusionClr>
+              <a:schemeClr val="bg1">
+                <a:lumMod val="50000"/>
+              </a:schemeClr>
+            </a:extrusionClr>
+          </a:sp3d>
+        </p:spPr>
+        <p:style>
+          <a:lnRef idx="2">
+            <a:schemeClr val="accent1">
+              <a:shade val="50000"/>
+            </a:schemeClr>
+          </a:lnRef>
+          <a:fillRef idx="1">
+            <a:schemeClr val="accent1"/>
+          </a:fillRef>
+          <a:effectRef idx="0">
+            <a:schemeClr val="accent1"/>
+          </a:effectRef>
+          <a:fontRef idx="minor">
+            <a:schemeClr val="lt1"/>
+          </a:fontRef>
+        </p:style>
+        <p:txBody>
+          <a:bodyPr rtlCol="0" anchor="ctr"/>
+          <a:lstStyle/>
+          <a:p>
+            <a:pPr algn="ctr"/>
+            <a:endParaRPr lang="en-US"/>
+          </a:p>
+        </p:txBody>
+      </p:sp>
+      <p:sp>
+        <p:nvSpPr>
+          <p:cNvPr id="6" name="Rectangle 5"/>
+          <p:cNvSpPr/>
+          <p:nvPr/>
+        </p:nvSpPr>
+        <p:spPr>
+          <a:xfrm>
+            <a:off x="3509428" y="1727200"/>
+            <a:ext cx="444500" cy="3098800"/>
+          </a:xfrm>
+          <a:prstGeom prst="rect">
+            <a:avLst/>
+          </a:prstGeom>
+          <a:solidFill>
+            <a:schemeClr val="accent2"/>
+          </a:solidFill>
+          <a:ln>
+            <a:noFill/>
+          </a:ln>
+          <a:scene3d>
+            <a:camera prst="isometricOffAxis1Left"/>
+            <a:lightRig rig="balanced" dir="t"/>
+          </a:scene3d>
+          <a:sp3d extrusionH="381000">
+            <a:extrusionClr>
+              <a:schemeClr val="accent2"/>
+            </a:extrusionClr>
+          </a:sp3d>
+        </p:spPr>
+        <p:style>
+          <a:lnRef idx="2">
+            <a:schemeClr val="accent1">
+              <a:shade val="50000"/>
+            </a:schemeClr>
+          </a:lnRef>
+          <a:fillRef idx="1">
+            <a:schemeClr val="accent1"/>
+          </a:fillRef>
+          <a:effectRef idx="0">
+            <a:schemeClr val="accent1"/>
+          </a:effectRef>
+          <a:fontRef idx="minor">
+            <a:schemeClr val="lt1"/>
+          </a:fontRef>
+        </p:style>
+        <p:txBody>
+          <a:bodyPr rtlCol="0" anchor="ctr"/>
+          <a:lstStyle/>
+          <a:p>
+            <a:pPr algn="ctr"/>
+            <a:endParaRPr lang="en-US"/>
+          </a:p>
+        </p:txBody>
+      </p:sp>
+      <p:sp>
+        <p:nvSpPr>
+          <p:cNvPr id="7" name="TextBox 6"/>
+          <p:cNvSpPr txBox="1"/>
+          <p:nvPr/>
+        </p:nvSpPr>
+        <p:spPr>
+          <a:xfrm>
+            <a:off x="1675298" y="5740397"/>
+            <a:ext cx="750525" cy="369332"/>
+          </a:xfrm>
+          <a:prstGeom prst="rect">
+            <a:avLst/>
+          </a:prstGeom>
+          <a:noFill/>
+        </p:spPr>
+        <p:txBody>
+          <a:bodyPr wrap="none" rtlCol="0">
+            <a:spAutoFit/>
+          </a:bodyPr>
+          <a:lstStyle/>
+          <a:p>
+            <a:pPr algn="ctr"/>
             <a:r>
               <a:rPr lang="en-US" dirty="0" smtClean="0"/>
-              <a:t>DCGAN-MNIST</a:t>
+              <a:t>x</a:t>
+            </a:r>
+            <a:r>
+              <a:rPr lang="en-US" smtClean="0"/>
+              <a:t>: 728</a:t>
             </a:r>
             <a:endParaRPr lang="en-US" dirty="0"/>
           </a:p>
@@ -5412,27 +6199,696 @@
       </p:sp>
       <p:sp>
         <p:nvSpPr>
-          <p:cNvPr id="3" name="Text Placeholder 2"/>
-          <p:cNvSpPr>
-            <a:spLocks noGrp="1"/>
-          </p:cNvSpPr>
-          <p:nvPr>
-            <p:ph type="body" idx="1"/>
-          </p:nvPr>
-        </p:nvSpPr>
-        <p:spPr/>
-        <p:txBody>
-          <a:bodyPr/>
-          <a:lstStyle/>
-          <a:p>
-            <a:endParaRPr lang="en-US"/>
+          <p:cNvPr id="8" name="TextBox 7"/>
+          <p:cNvSpPr txBox="1"/>
+          <p:nvPr/>
+        </p:nvSpPr>
+        <p:spPr>
+          <a:xfrm>
+            <a:off x="3514673" y="5740397"/>
+            <a:ext cx="878509" cy="369332"/>
+          </a:xfrm>
+          <a:prstGeom prst="rect">
+            <a:avLst/>
+          </a:prstGeom>
+          <a:noFill/>
+        </p:spPr>
+        <p:txBody>
+          <a:bodyPr wrap="none" rtlCol="0">
+            <a:spAutoFit/>
+          </a:bodyPr>
+          <a:lstStyle/>
+          <a:p>
+            <a:pPr algn="ctr"/>
+            <a:r>
+              <a:rPr lang="en-US" dirty="0" smtClean="0"/>
+              <a:t>FC: 128</a:t>
+            </a:r>
+          </a:p>
+        </p:txBody>
+      </p:sp>
+      <p:sp>
+        <p:nvSpPr>
+          <p:cNvPr id="9" name="Rectangle 8"/>
+          <p:cNvSpPr/>
+          <p:nvPr/>
+        </p:nvSpPr>
+        <p:spPr>
+          <a:xfrm>
+            <a:off x="4577272" y="1727200"/>
+            <a:ext cx="444500" cy="3098800"/>
+          </a:xfrm>
+          <a:prstGeom prst="rect">
+            <a:avLst/>
+          </a:prstGeom>
+          <a:solidFill>
+            <a:schemeClr val="accent4"/>
+          </a:solidFill>
+          <a:ln>
+            <a:noFill/>
+          </a:ln>
+          <a:scene3d>
+            <a:camera prst="isometricOffAxis1Left"/>
+            <a:lightRig rig="balanced" dir="t"/>
+          </a:scene3d>
+          <a:sp3d extrusionH="381000">
+            <a:extrusionClr>
+              <a:schemeClr val="accent4"/>
+            </a:extrusionClr>
+          </a:sp3d>
+        </p:spPr>
+        <p:style>
+          <a:lnRef idx="2">
+            <a:schemeClr val="accent1">
+              <a:shade val="50000"/>
+            </a:schemeClr>
+          </a:lnRef>
+          <a:fillRef idx="1">
+            <a:schemeClr val="accent1"/>
+          </a:fillRef>
+          <a:effectRef idx="0">
+            <a:schemeClr val="accent1"/>
+          </a:effectRef>
+          <a:fontRef idx="minor">
+            <a:schemeClr val="lt1"/>
+          </a:fontRef>
+        </p:style>
+        <p:txBody>
+          <a:bodyPr rtlCol="0" anchor="ctr"/>
+          <a:lstStyle/>
+          <a:p>
+            <a:pPr algn="ctr"/>
+            <a:endParaRPr lang="en-US"/>
+          </a:p>
+        </p:txBody>
+      </p:sp>
+      <p:sp>
+        <p:nvSpPr>
+          <p:cNvPr id="10" name="TextBox 9"/>
+          <p:cNvSpPr txBox="1"/>
+          <p:nvPr/>
+        </p:nvSpPr>
+        <p:spPr>
+          <a:xfrm>
+            <a:off x="4663341" y="5740397"/>
+            <a:ext cx="716863" cy="646331"/>
+          </a:xfrm>
+          <a:prstGeom prst="rect">
+            <a:avLst/>
+          </a:prstGeom>
+          <a:noFill/>
+        </p:spPr>
+        <p:txBody>
+          <a:bodyPr wrap="none" rtlCol="0">
+            <a:spAutoFit/>
+          </a:bodyPr>
+          <a:lstStyle/>
+          <a:p>
+            <a:pPr algn="ctr"/>
+            <a:r>
+              <a:rPr lang="en-US" dirty="0" smtClean="0"/>
+              <a:t>Leaky</a:t>
+            </a:r>
+          </a:p>
+          <a:p>
+            <a:pPr algn="ctr"/>
+            <a:r>
+              <a:rPr lang="en-US" dirty="0" err="1" smtClean="0"/>
+              <a:t>ReLU</a:t>
+            </a:r>
+            <a:endParaRPr lang="en-US" dirty="0" smtClean="0"/>
+          </a:p>
+        </p:txBody>
+      </p:sp>
+      <p:sp>
+        <p:nvSpPr>
+          <p:cNvPr id="11" name="Rectangle 10"/>
+          <p:cNvSpPr/>
+          <p:nvPr/>
+        </p:nvSpPr>
+        <p:spPr>
+          <a:xfrm>
+            <a:off x="6325865" y="2760132"/>
+            <a:ext cx="444500" cy="1278467"/>
+          </a:xfrm>
+          <a:prstGeom prst="rect">
+            <a:avLst/>
+          </a:prstGeom>
+          <a:solidFill>
+            <a:schemeClr val="accent2"/>
+          </a:solidFill>
+          <a:ln>
+            <a:noFill/>
+          </a:ln>
+          <a:scene3d>
+            <a:camera prst="isometricOffAxis1Left"/>
+            <a:lightRig rig="balanced" dir="t"/>
+          </a:scene3d>
+          <a:sp3d extrusionH="381000">
+            <a:extrusionClr>
+              <a:schemeClr val="accent2"/>
+            </a:extrusionClr>
+          </a:sp3d>
+        </p:spPr>
+        <p:style>
+          <a:lnRef idx="2">
+            <a:schemeClr val="accent1">
+              <a:shade val="50000"/>
+            </a:schemeClr>
+          </a:lnRef>
+          <a:fillRef idx="1">
+            <a:schemeClr val="accent1"/>
+          </a:fillRef>
+          <a:effectRef idx="0">
+            <a:schemeClr val="accent1"/>
+          </a:effectRef>
+          <a:fontRef idx="minor">
+            <a:schemeClr val="lt1"/>
+          </a:fontRef>
+        </p:style>
+        <p:txBody>
+          <a:bodyPr rtlCol="0" anchor="ctr"/>
+          <a:lstStyle/>
+          <a:p>
+            <a:pPr algn="ctr"/>
+            <a:endParaRPr lang="en-US"/>
+          </a:p>
+        </p:txBody>
+      </p:sp>
+      <p:sp>
+        <p:nvSpPr>
+          <p:cNvPr id="12" name="TextBox 11"/>
+          <p:cNvSpPr txBox="1"/>
+          <p:nvPr/>
+        </p:nvSpPr>
+        <p:spPr>
+          <a:xfrm>
+            <a:off x="6442884" y="5740397"/>
+            <a:ext cx="761491" cy="369332"/>
+          </a:xfrm>
+          <a:prstGeom prst="rect">
+            <a:avLst/>
+          </a:prstGeom>
+          <a:noFill/>
+        </p:spPr>
+        <p:txBody>
+          <a:bodyPr wrap="none" rtlCol="0">
+            <a:spAutoFit/>
+          </a:bodyPr>
+          <a:lstStyle/>
+          <a:p>
+            <a:pPr algn="ctr"/>
+            <a:r>
+              <a:rPr lang="en-US" dirty="0" smtClean="0"/>
+              <a:t>FC: 64</a:t>
+            </a:r>
+          </a:p>
+        </p:txBody>
+      </p:sp>
+      <p:sp>
+        <p:nvSpPr>
+          <p:cNvPr id="13" name="Rectangle 12"/>
+          <p:cNvSpPr/>
+          <p:nvPr/>
+        </p:nvSpPr>
+        <p:spPr>
+          <a:xfrm>
+            <a:off x="7493776" y="2760132"/>
+            <a:ext cx="444500" cy="1278468"/>
+          </a:xfrm>
+          <a:prstGeom prst="rect">
+            <a:avLst/>
+          </a:prstGeom>
+          <a:solidFill>
+            <a:schemeClr val="accent4"/>
+          </a:solidFill>
+          <a:ln>
+            <a:noFill/>
+          </a:ln>
+          <a:scene3d>
+            <a:camera prst="isometricOffAxis1Left"/>
+            <a:lightRig rig="balanced" dir="t"/>
+          </a:scene3d>
+          <a:sp3d extrusionH="381000">
+            <a:extrusionClr>
+              <a:schemeClr val="accent4"/>
+            </a:extrusionClr>
+          </a:sp3d>
+        </p:spPr>
+        <p:style>
+          <a:lnRef idx="2">
+            <a:schemeClr val="accent1">
+              <a:shade val="50000"/>
+            </a:schemeClr>
+          </a:lnRef>
+          <a:fillRef idx="1">
+            <a:schemeClr val="accent1"/>
+          </a:fillRef>
+          <a:effectRef idx="0">
+            <a:schemeClr val="accent1"/>
+          </a:effectRef>
+          <a:fontRef idx="minor">
+            <a:schemeClr val="lt1"/>
+          </a:fontRef>
+        </p:style>
+        <p:txBody>
+          <a:bodyPr rtlCol="0" anchor="ctr"/>
+          <a:lstStyle/>
+          <a:p>
+            <a:pPr algn="ctr"/>
+            <a:endParaRPr lang="en-US"/>
+          </a:p>
+        </p:txBody>
+      </p:sp>
+      <p:sp>
+        <p:nvSpPr>
+          <p:cNvPr id="14" name="TextBox 13"/>
+          <p:cNvSpPr txBox="1"/>
+          <p:nvPr/>
+        </p:nvSpPr>
+        <p:spPr>
+          <a:xfrm>
+            <a:off x="7533043" y="5740397"/>
+            <a:ext cx="716863" cy="646331"/>
+          </a:xfrm>
+          <a:prstGeom prst="rect">
+            <a:avLst/>
+          </a:prstGeom>
+          <a:noFill/>
+        </p:spPr>
+        <p:txBody>
+          <a:bodyPr wrap="none" rtlCol="0">
+            <a:spAutoFit/>
+          </a:bodyPr>
+          <a:lstStyle/>
+          <a:p>
+            <a:pPr algn="ctr"/>
+            <a:r>
+              <a:rPr lang="en-US" dirty="0" smtClean="0"/>
+              <a:t>Leaky</a:t>
+            </a:r>
+          </a:p>
+          <a:p>
+            <a:pPr algn="ctr"/>
+            <a:r>
+              <a:rPr lang="en-US" dirty="0" err="1" smtClean="0"/>
+              <a:t>ReLU</a:t>
+            </a:r>
+            <a:endParaRPr lang="en-US" dirty="0" smtClean="0"/>
+          </a:p>
+        </p:txBody>
+      </p:sp>
+      <p:sp>
+        <p:nvSpPr>
+          <p:cNvPr id="15" name="Rectangle 14"/>
+          <p:cNvSpPr/>
+          <p:nvPr/>
+        </p:nvSpPr>
+        <p:spPr>
+          <a:xfrm>
+            <a:off x="9119407" y="3183467"/>
+            <a:ext cx="444500" cy="558800"/>
+          </a:xfrm>
+          <a:prstGeom prst="rect">
+            <a:avLst/>
+          </a:prstGeom>
+          <a:solidFill>
+            <a:schemeClr val="accent2"/>
+          </a:solidFill>
+          <a:ln>
+            <a:noFill/>
+          </a:ln>
+          <a:scene3d>
+            <a:camera prst="isometricOffAxis1Left"/>
+            <a:lightRig rig="balanced" dir="t"/>
+          </a:scene3d>
+          <a:sp3d extrusionH="381000">
+            <a:extrusionClr>
+              <a:schemeClr val="accent2"/>
+            </a:extrusionClr>
+          </a:sp3d>
+        </p:spPr>
+        <p:style>
+          <a:lnRef idx="2">
+            <a:schemeClr val="accent1">
+              <a:shade val="50000"/>
+            </a:schemeClr>
+          </a:lnRef>
+          <a:fillRef idx="1">
+            <a:schemeClr val="accent1"/>
+          </a:fillRef>
+          <a:effectRef idx="0">
+            <a:schemeClr val="accent1"/>
+          </a:effectRef>
+          <a:fontRef idx="minor">
+            <a:schemeClr val="lt1"/>
+          </a:fontRef>
+        </p:style>
+        <p:txBody>
+          <a:bodyPr rtlCol="0" anchor="ctr"/>
+          <a:lstStyle/>
+          <a:p>
+            <a:pPr algn="ctr"/>
+            <a:endParaRPr lang="en-US"/>
+          </a:p>
+        </p:txBody>
+      </p:sp>
+      <p:sp>
+        <p:nvSpPr>
+          <p:cNvPr id="16" name="TextBox 15"/>
+          <p:cNvSpPr txBox="1"/>
+          <p:nvPr/>
+        </p:nvSpPr>
+        <p:spPr>
+          <a:xfrm>
+            <a:off x="9234915" y="5740397"/>
+            <a:ext cx="644472" cy="369332"/>
+          </a:xfrm>
+          <a:prstGeom prst="rect">
+            <a:avLst/>
+          </a:prstGeom>
+          <a:noFill/>
+        </p:spPr>
+        <p:txBody>
+          <a:bodyPr wrap="none" rtlCol="0">
+            <a:spAutoFit/>
+          </a:bodyPr>
+          <a:lstStyle/>
+          <a:p>
+            <a:pPr algn="ctr"/>
+            <a:r>
+              <a:rPr lang="en-US" dirty="0" smtClean="0"/>
+              <a:t>FC: 1</a:t>
+            </a:r>
+          </a:p>
+        </p:txBody>
+      </p:sp>
+      <p:sp>
+        <p:nvSpPr>
+          <p:cNvPr id="17" name="Rectangle 16"/>
+          <p:cNvSpPr/>
+          <p:nvPr/>
+        </p:nvSpPr>
+        <p:spPr>
+          <a:xfrm>
+            <a:off x="10171364" y="3183467"/>
+            <a:ext cx="444500" cy="558800"/>
+          </a:xfrm>
+          <a:prstGeom prst="rect">
+            <a:avLst/>
+          </a:prstGeom>
+          <a:solidFill>
+            <a:schemeClr val="accent5"/>
+          </a:solidFill>
+          <a:ln>
+            <a:noFill/>
+          </a:ln>
+          <a:scene3d>
+            <a:camera prst="isometricOffAxis1Left"/>
+            <a:lightRig rig="balanced" dir="t"/>
+          </a:scene3d>
+          <a:sp3d extrusionH="381000">
+            <a:extrusionClr>
+              <a:schemeClr val="accent5"/>
+            </a:extrusionClr>
+          </a:sp3d>
+        </p:spPr>
+        <p:style>
+          <a:lnRef idx="2">
+            <a:schemeClr val="accent1">
+              <a:shade val="50000"/>
+            </a:schemeClr>
+          </a:lnRef>
+          <a:fillRef idx="1">
+            <a:schemeClr val="accent1"/>
+          </a:fillRef>
+          <a:effectRef idx="0">
+            <a:schemeClr val="accent1"/>
+          </a:effectRef>
+          <a:fontRef idx="minor">
+            <a:schemeClr val="lt1"/>
+          </a:fontRef>
+        </p:style>
+        <p:txBody>
+          <a:bodyPr rtlCol="0" anchor="ctr"/>
+          <a:lstStyle/>
+          <a:p>
+            <a:pPr algn="ctr"/>
+            <a:endParaRPr lang="en-US"/>
+          </a:p>
+        </p:txBody>
+      </p:sp>
+      <p:sp>
+        <p:nvSpPr>
+          <p:cNvPr id="18" name="TextBox 17"/>
+          <p:cNvSpPr txBox="1"/>
+          <p:nvPr/>
+        </p:nvSpPr>
+        <p:spPr>
+          <a:xfrm>
+            <a:off x="10166377" y="5740397"/>
+            <a:ext cx="917239" cy="369332"/>
+          </a:xfrm>
+          <a:prstGeom prst="rect">
+            <a:avLst/>
+          </a:prstGeom>
+          <a:noFill/>
+        </p:spPr>
+        <p:txBody>
+          <a:bodyPr wrap="none" rtlCol="0">
+            <a:spAutoFit/>
+          </a:bodyPr>
+          <a:lstStyle/>
+          <a:p>
+            <a:pPr algn="ctr"/>
+            <a:r>
+              <a:rPr lang="en-US" dirty="0" smtClean="0"/>
+              <a:t>sigmoid</a:t>
+            </a:r>
+          </a:p>
+        </p:txBody>
+      </p:sp>
+      <p:sp>
+        <p:nvSpPr>
+          <p:cNvPr id="20" name="Rectangle 19"/>
+          <p:cNvSpPr/>
+          <p:nvPr/>
+        </p:nvSpPr>
+        <p:spPr>
+          <a:xfrm>
+            <a:off x="1473195" y="592667"/>
+            <a:ext cx="1173487" cy="5794061"/>
+          </a:xfrm>
+          <a:prstGeom prst="rect">
+            <a:avLst/>
+          </a:prstGeom>
+          <a:noFill/>
+          <a:ln>
+            <a:solidFill>
+              <a:schemeClr val="tx1"/>
+            </a:solidFill>
+            <a:prstDash val="dash"/>
+          </a:ln>
+        </p:spPr>
+        <p:style>
+          <a:lnRef idx="2">
+            <a:schemeClr val="accent1">
+              <a:shade val="50000"/>
+            </a:schemeClr>
+          </a:lnRef>
+          <a:fillRef idx="1">
+            <a:schemeClr val="accent1"/>
+          </a:fillRef>
+          <a:effectRef idx="0">
+            <a:schemeClr val="accent1"/>
+          </a:effectRef>
+          <a:fontRef idx="minor">
+            <a:schemeClr val="lt1"/>
+          </a:fontRef>
+        </p:style>
+        <p:txBody>
+          <a:bodyPr rtlCol="0" anchor="ctr"/>
+          <a:lstStyle/>
+          <a:p>
+            <a:pPr algn="ctr"/>
+            <a:endParaRPr lang="en-US"/>
+          </a:p>
+        </p:txBody>
+      </p:sp>
+      <p:sp>
+        <p:nvSpPr>
+          <p:cNvPr id="21" name="Rectangle 20"/>
+          <p:cNvSpPr/>
+          <p:nvPr/>
+        </p:nvSpPr>
+        <p:spPr>
+          <a:xfrm>
+            <a:off x="3353186" y="592666"/>
+            <a:ext cx="2163198" cy="5794061"/>
+          </a:xfrm>
+          <a:prstGeom prst="rect">
+            <a:avLst/>
+          </a:prstGeom>
+          <a:noFill/>
+          <a:ln>
+            <a:solidFill>
+              <a:schemeClr val="tx1"/>
+            </a:solidFill>
+            <a:prstDash val="dash"/>
+          </a:ln>
+        </p:spPr>
+        <p:style>
+          <a:lnRef idx="2">
+            <a:schemeClr val="accent1">
+              <a:shade val="50000"/>
+            </a:schemeClr>
+          </a:lnRef>
+          <a:fillRef idx="1">
+            <a:schemeClr val="accent1"/>
+          </a:fillRef>
+          <a:effectRef idx="0">
+            <a:schemeClr val="accent1"/>
+          </a:effectRef>
+          <a:fontRef idx="minor">
+            <a:schemeClr val="lt1"/>
+          </a:fontRef>
+        </p:style>
+        <p:txBody>
+          <a:bodyPr rtlCol="0" anchor="ctr"/>
+          <a:lstStyle/>
+          <a:p>
+            <a:pPr algn="ctr"/>
+            <a:endParaRPr lang="en-US"/>
+          </a:p>
+        </p:txBody>
+      </p:sp>
+      <p:sp>
+        <p:nvSpPr>
+          <p:cNvPr id="22" name="Rectangle 21"/>
+          <p:cNvSpPr/>
+          <p:nvPr/>
+        </p:nvSpPr>
+        <p:spPr>
+          <a:xfrm>
+            <a:off x="6235099" y="592665"/>
+            <a:ext cx="2163198" cy="5794061"/>
+          </a:xfrm>
+          <a:prstGeom prst="rect">
+            <a:avLst/>
+          </a:prstGeom>
+          <a:noFill/>
+          <a:ln>
+            <a:solidFill>
+              <a:schemeClr val="tx1"/>
+            </a:solidFill>
+            <a:prstDash val="dash"/>
+          </a:ln>
+        </p:spPr>
+        <p:style>
+          <a:lnRef idx="2">
+            <a:schemeClr val="accent1">
+              <a:shade val="50000"/>
+            </a:schemeClr>
+          </a:lnRef>
+          <a:fillRef idx="1">
+            <a:schemeClr val="accent1"/>
+          </a:fillRef>
+          <a:effectRef idx="0">
+            <a:schemeClr val="accent1"/>
+          </a:effectRef>
+          <a:fontRef idx="minor">
+            <a:schemeClr val="lt1"/>
+          </a:fontRef>
+        </p:style>
+        <p:txBody>
+          <a:bodyPr rtlCol="0" anchor="ctr"/>
+          <a:lstStyle/>
+          <a:p>
+            <a:pPr algn="ctr"/>
+            <a:endParaRPr lang="en-US"/>
+          </a:p>
+        </p:txBody>
+      </p:sp>
+      <p:sp>
+        <p:nvSpPr>
+          <p:cNvPr id="23" name="Rectangle 22"/>
+          <p:cNvSpPr/>
+          <p:nvPr/>
+        </p:nvSpPr>
+        <p:spPr>
+          <a:xfrm>
+            <a:off x="8923204" y="592664"/>
+            <a:ext cx="2163198" cy="5794061"/>
+          </a:xfrm>
+          <a:prstGeom prst="rect">
+            <a:avLst/>
+          </a:prstGeom>
+          <a:noFill/>
+          <a:ln>
+            <a:solidFill>
+              <a:schemeClr val="tx1"/>
+            </a:solidFill>
+            <a:prstDash val="dash"/>
+          </a:ln>
+        </p:spPr>
+        <p:style>
+          <a:lnRef idx="2">
+            <a:schemeClr val="accent1">
+              <a:shade val="50000"/>
+            </a:schemeClr>
+          </a:lnRef>
+          <a:fillRef idx="1">
+            <a:schemeClr val="accent1"/>
+          </a:fillRef>
+          <a:effectRef idx="0">
+            <a:schemeClr val="accent1"/>
+          </a:effectRef>
+          <a:fontRef idx="minor">
+            <a:schemeClr val="lt1"/>
+          </a:fontRef>
+        </p:style>
+        <p:txBody>
+          <a:bodyPr rtlCol="0" anchor="ctr"/>
+          <a:lstStyle/>
+          <a:p>
+            <a:pPr algn="ctr"/>
+            <a:endParaRPr lang="en-US"/>
+          </a:p>
+        </p:txBody>
+      </p:sp>
+      <p:sp>
+        <p:nvSpPr>
+          <p:cNvPr id="24" name="TextBox 23"/>
+          <p:cNvSpPr txBox="1"/>
+          <p:nvPr/>
+        </p:nvSpPr>
+        <p:spPr>
+          <a:xfrm>
+            <a:off x="304800" y="304800"/>
+            <a:ext cx="830677" cy="1323439"/>
+          </a:xfrm>
+          <a:prstGeom prst="rect">
+            <a:avLst/>
+          </a:prstGeom>
+          <a:noFill/>
+        </p:spPr>
+        <p:txBody>
+          <a:bodyPr wrap="none" rtlCol="0">
+            <a:spAutoFit/>
+          </a:bodyPr>
+          <a:lstStyle/>
+          <a:p>
+            <a:r>
+              <a:rPr lang="en-US" sz="8000" b="1" i="1" dirty="0"/>
+              <a:t>D</a:t>
+            </a:r>
           </a:p>
         </p:txBody>
       </p:sp>
     </p:spTree>
     <p:extLst>
       <p:ext uri="{BB962C8B-B14F-4D97-AF65-F5344CB8AC3E}">
-        <p14:creationId xmlns:p14="http://schemas.microsoft.com/office/powerpoint/2010/main" val="485818409"/>
+        <p14:creationId xmlns:p14="http://schemas.microsoft.com/office/powerpoint/2010/main" val="1974440172"/>
       </p:ext>
     </p:extLst>
   </p:cSld>
@@ -5461,6 +6917,78 @@
       </p:grpSpPr>
       <p:sp>
         <p:nvSpPr>
+          <p:cNvPr id="2" name="Title 1"/>
+          <p:cNvSpPr>
+            <a:spLocks noGrp="1"/>
+          </p:cNvSpPr>
+          <p:nvPr>
+            <p:ph type="title"/>
+          </p:nvPr>
+        </p:nvSpPr>
+        <p:spPr/>
+        <p:txBody>
+          <a:bodyPr/>
+          <a:lstStyle/>
+          <a:p>
+            <a:r>
+              <a:rPr lang="en-US" dirty="0" smtClean="0"/>
+              <a:t>DCGAN-MNIST</a:t>
+            </a:r>
+            <a:endParaRPr lang="en-US" dirty="0"/>
+          </a:p>
+        </p:txBody>
+      </p:sp>
+      <p:sp>
+        <p:nvSpPr>
+          <p:cNvPr id="3" name="Text Placeholder 2"/>
+          <p:cNvSpPr>
+            <a:spLocks noGrp="1"/>
+          </p:cNvSpPr>
+          <p:nvPr>
+            <p:ph type="body" idx="1"/>
+          </p:nvPr>
+        </p:nvSpPr>
+        <p:spPr/>
+        <p:txBody>
+          <a:bodyPr/>
+          <a:lstStyle/>
+          <a:p>
+            <a:endParaRPr lang="en-US"/>
+          </a:p>
+        </p:txBody>
+      </p:sp>
+    </p:spTree>
+    <p:extLst>
+      <p:ext uri="{BB962C8B-B14F-4D97-AF65-F5344CB8AC3E}">
+        <p14:creationId xmlns:p14="http://schemas.microsoft.com/office/powerpoint/2010/main" val="485818409"/>
+      </p:ext>
+    </p:extLst>
+  </p:cSld>
+  <p:clrMapOvr>
+    <a:masterClrMapping/>
+  </p:clrMapOvr>
+</p:sld>
+</file>
+
+<file path=ppt/slides/slide7.xml><?xml version="1.0" encoding="utf-8"?>
+<p:sld xmlns:a="http://schemas.openxmlformats.org/drawingml/2006/main" xmlns:r="http://schemas.openxmlformats.org/officeDocument/2006/relationships" xmlns:p="http://schemas.openxmlformats.org/presentationml/2006/main">
+  <p:cSld>
+    <p:spTree>
+      <p:nvGrpSpPr>
+        <p:cNvPr id="1" name=""/>
+        <p:cNvGrpSpPr/>
+        <p:nvPr/>
+      </p:nvGrpSpPr>
+      <p:grpSpPr>
+        <a:xfrm>
+          <a:off x="0" y="0"/>
+          <a:ext cx="0" cy="0"/>
+          <a:chOff x="0" y="0"/>
+          <a:chExt cx="0" cy="0"/>
+        </a:xfrm>
+      </p:grpSpPr>
+      <p:sp>
+        <p:nvSpPr>
           <p:cNvPr id="25" name="Right Arrow 24"/>
           <p:cNvSpPr/>
           <p:nvPr/>
@@ -7110,7 +8638,7 @@
 </p:sld>
 </file>
 
-<file path=ppt/slides/slide7.xml><?xml version="1.0" encoding="utf-8"?>
+<file path=ppt/slides/slide8.xml><?xml version="1.0" encoding="utf-8"?>
 <p:sld xmlns:a="http://schemas.openxmlformats.org/drawingml/2006/main" xmlns:r="http://schemas.openxmlformats.org/officeDocument/2006/relationships" xmlns:p="http://schemas.openxmlformats.org/presentationml/2006/main">
   <p:cSld>
     <p:spTree>

</xml_diff>